<commit_message>
chore: add gitignore to root
</commit_message>
<xml_diff>
--- a/devConf-2024-mfe.pptx
+++ b/devConf-2024-mfe.pptx
@@ -252,7 +252,7 @@
           <a:p>
             <a:fld id="{03AB2F5F-49ED-40E3-A1A5-941FF8279870}" type="datetimeFigureOut">
               <a:rPr lang="en-US" smtClean="0"/>
-              <a:t>3/23/2024</a:t>
+              <a:t>3/25/2024</a:t>
             </a:fld>
             <a:endParaRPr lang="en-US" dirty="0"/>
           </a:p>
@@ -429,7 +429,7 @@
           <a:p>
             <a:fld id="{6C2C1060-699B-414A-8D16-7630F8BDD05E}" type="datetimeFigureOut">
               <a:rPr lang="en-US" smtClean="0"/>
-              <a:t>3/23/2024</a:t>
+              <a:t>3/25/2024</a:t>
             </a:fld>
             <a:endParaRPr lang="en-US" dirty="0"/>
           </a:p>
@@ -6781,8 +6781,32 @@
               </a:spcBef>
             </a:pPr>
             <a:r>
-              <a:rPr lang="en-US" sz="7500"/>
-              <a:t>Micro-frontends: klein in formaat, groot in impact</a:t>
+              <a:rPr lang="en-US" sz="7500" dirty="0"/>
+              <a:t>Micro-frontends: </a:t>
+            </a:r>
+            <a:r>
+              <a:rPr lang="en-US" sz="7500" dirty="0" err="1"/>
+              <a:t>klein</a:t>
+            </a:r>
+            <a:r>
+              <a:rPr lang="en-US" sz="7500" dirty="0"/>
+              <a:t> in </a:t>
+            </a:r>
+            <a:r>
+              <a:rPr lang="en-US" sz="7500" dirty="0" err="1"/>
+              <a:t>formaat</a:t>
+            </a:r>
+            <a:r>
+              <a:rPr lang="en-US" sz="7500" dirty="0"/>
+              <a:t>, </a:t>
+            </a:r>
+            <a:r>
+              <a:rPr lang="en-US" sz="7500" dirty="0" err="1"/>
+              <a:t>groot</a:t>
+            </a:r>
+            <a:r>
+              <a:rPr lang="en-US" sz="7500" dirty="0"/>
+              <a:t> in impact</a:t>
             </a:r>
           </a:p>
         </p:txBody>
@@ -6817,21 +6841,27 @@
           <a:p>
             <a:pPr algn="ctr"/>
             <a:r>
-              <a:rPr lang="en-US" sz="3600">
+              <a:rPr lang="en-US" sz="3600" dirty="0">
                 <a:cs typeface="+mn-cs"/>
               </a:rPr>
               <a:t>Rogier Wijnands</a:t>
             </a:r>
             <a:br>
-              <a:rPr lang="en-US" sz="3600">
+              <a:rPr lang="en-US" sz="3600" dirty="0">
                 <a:cs typeface="+mn-cs"/>
               </a:rPr>
             </a:br>
             <a:r>
-              <a:rPr lang="en-US" sz="3600">
+              <a:rPr lang="en-US" sz="3600" dirty="0" err="1">
                 <a:cs typeface="+mn-cs"/>
               </a:rPr>
-              <a:t>devConf 2024 🎉</a:t>
+              <a:t>devConf</a:t>
+            </a:r>
+            <a:r>
+              <a:rPr lang="en-US" sz="3600" dirty="0">
+                <a:cs typeface="+mn-cs"/>
+              </a:rPr>
+              <a:t> 2024 🎉</a:t>
             </a:r>
           </a:p>
         </p:txBody>
@@ -7651,7 +7681,7 @@
                   <a:schemeClr val="tx1"/>
                 </a:solidFill>
               </a:rPr>
-              <a:t>Zalando server-side composition</a:t>
+              <a:t>server-side composition</a:t>
             </a:r>
           </a:p>
         </p:txBody>
@@ -10305,7 +10335,7 @@
                 <a:effectLst/>
                 <a:latin typeface="Söhne"/>
               </a:rPr>
-              <a:t>- Elk </a:t>
+              <a:t>- Elke </a:t>
             </a:r>
             <a:r>
               <a:rPr lang="nl-NL" sz="2400" b="0" i="0" cap="none" dirty="0" err="1">
@@ -11761,14 +11791,6 @@
           <a:lstStyle/>
           <a:p>
             <a:pPr algn="ctr"/>
-            <a:r>
-              <a:rPr lang="en-US" sz="5400" dirty="0">
-                <a:solidFill>
-                  <a:schemeClr val="tx1"/>
-                </a:solidFill>
-              </a:rPr>
-              <a:t>Spotify </a:t>
-            </a:r>
             <a:r>
               <a:rPr lang="en-US" sz="5400" dirty="0" err="1">
                 <a:solidFill>
@@ -12698,25 +12720,6 @@
 </file>
 
 <file path=customXml/item1.xml><?xml version="1.0" encoding="utf-8"?>
-<p:properties xmlns:p="http://schemas.microsoft.com/office/2006/metadata/properties" xmlns:xsi="http://www.w3.org/2001/XMLSchema-instance" xmlns:pc="http://schemas.microsoft.com/office/infopath/2007/PartnerControls">
-  <documentManagement>
-    <Status xmlns="71af3243-3dd4-4a8d-8c0d-dd76da1f02a5">Not started</Status>
-    <_ip_UnifiedCompliancePolicyUIAction xmlns="http://schemas.microsoft.com/sharepoint/v3" xsi:nil="true"/>
-    <Image xmlns="71af3243-3dd4-4a8d-8c0d-dd76da1f02a5">
-      <Url xsi:nil="true"/>
-      <Description xsi:nil="true"/>
-    </Image>
-    <_ip_UnifiedCompliancePolicyProperties xmlns="http://schemas.microsoft.com/sharepoint/v3" xsi:nil="true"/>
-    <ImageTagsTaxHTField xmlns="71af3243-3dd4-4a8d-8c0d-dd76da1f02a5">
-      <Terms xmlns="http://schemas.microsoft.com/office/infopath/2007/PartnerControls"/>
-    </ImageTagsTaxHTField>
-    <TaxCatchAll xmlns="230e9df3-be65-4c73-a93b-d1236ebd677e"/>
-    <MediaServiceKeyPoints xmlns="71af3243-3dd4-4a8d-8c0d-dd76da1f02a5" xsi:nil="true"/>
-  </documentManagement>
-</p:properties>
-</file>
-
-<file path=customXml/item2.xml><?xml version="1.0" encoding="utf-8"?>
 <ct:contentTypeSchema xmlns:ct="http://schemas.microsoft.com/office/2006/metadata/contentType" xmlns:ma="http://schemas.microsoft.com/office/2006/metadata/properties/metaAttributes" ct:_="" ma:_="" ma:contentTypeName="Document" ma:contentTypeID="0x01010079F111ED35F8CC479449609E8A0923A6" ma:contentTypeVersion="20" ma:contentTypeDescription="Create a new document." ma:contentTypeScope="" ma:versionID="1267097ee5f5874adfcc408041ae252e">
   <xsd:schema xmlns:xsd="http://www.w3.org/2001/XMLSchema" xmlns:xs="http://www.w3.org/2001/XMLSchema" xmlns:p="http://schemas.microsoft.com/office/2006/metadata/properties" xmlns:ns1="http://schemas.microsoft.com/sharepoint/v3" xmlns:ns2="71af3243-3dd4-4a8d-8c0d-dd76da1f02a5" xmlns:ns3="16c05727-aa75-4e4a-9b5f-8a80a1165891" xmlns:ns4="230e9df3-be65-4c73-a93b-d1236ebd677e" targetNamespace="http://schemas.microsoft.com/office/2006/metadata/properties" ma:root="true" ma:fieldsID="395891a93df65b14727750f2c06c306c" ns1:_="" ns2:_="" ns3:_="" ns4:_="">
     <xsd:import namespace="http://schemas.microsoft.com/sharepoint/v3"/>
@@ -12992,6 +12995,25 @@
 </ct:contentTypeSchema>
 </file>
 
+<file path=customXml/item2.xml><?xml version="1.0" encoding="utf-8"?>
+<p:properties xmlns:p="http://schemas.microsoft.com/office/2006/metadata/properties" xmlns:xsi="http://www.w3.org/2001/XMLSchema-instance" xmlns:pc="http://schemas.microsoft.com/office/infopath/2007/PartnerControls">
+  <documentManagement>
+    <Status xmlns="71af3243-3dd4-4a8d-8c0d-dd76da1f02a5">Not started</Status>
+    <_ip_UnifiedCompliancePolicyUIAction xmlns="http://schemas.microsoft.com/sharepoint/v3" xsi:nil="true"/>
+    <Image xmlns="71af3243-3dd4-4a8d-8c0d-dd76da1f02a5">
+      <Url xsi:nil="true"/>
+      <Description xsi:nil="true"/>
+    </Image>
+    <_ip_UnifiedCompliancePolicyProperties xmlns="http://schemas.microsoft.com/sharepoint/v3" xsi:nil="true"/>
+    <ImageTagsTaxHTField xmlns="71af3243-3dd4-4a8d-8c0d-dd76da1f02a5">
+      <Terms xmlns="http://schemas.microsoft.com/office/infopath/2007/PartnerControls"/>
+    </ImageTagsTaxHTField>
+    <TaxCatchAll xmlns="230e9df3-be65-4c73-a93b-d1236ebd677e"/>
+    <MediaServiceKeyPoints xmlns="71af3243-3dd4-4a8d-8c0d-dd76da1f02a5" xsi:nil="true"/>
+  </documentManagement>
+</p:properties>
+</file>
+
 <file path=customXml/item3.xml><?xml version="1.0" encoding="utf-8"?>
 <?mso-contentType ?>
 <FormTemplates xmlns="http://schemas.microsoft.com/sharepoint/v3/contenttype/forms">
@@ -13002,18 +13024,6 @@
 </file>
 
 <file path=customXml/itemProps1.xml><?xml version="1.0" encoding="utf-8"?>
-<ds:datastoreItem xmlns:ds="http://schemas.openxmlformats.org/officeDocument/2006/customXml" ds:itemID="{AC069F72-2015-4FB6-9588-A49CB14BDC12}">
-  <ds:schemaRefs>
-    <ds:schemaRef ds:uri="http://schemas.microsoft.com/office/2006/metadata/properties"/>
-    <ds:schemaRef ds:uri="http://schemas.microsoft.com/office/infopath/2007/PartnerControls"/>
-    <ds:schemaRef ds:uri="71af3243-3dd4-4a8d-8c0d-dd76da1f02a5"/>
-    <ds:schemaRef ds:uri="http://schemas.microsoft.com/sharepoint/v3"/>
-    <ds:schemaRef ds:uri="230e9df3-be65-4c73-a93b-d1236ebd677e"/>
-  </ds:schemaRefs>
-</ds:datastoreItem>
-</file>
-
-<file path=customXml/itemProps2.xml><?xml version="1.0" encoding="utf-8"?>
 <ds:datastoreItem xmlns:ds="http://schemas.openxmlformats.org/officeDocument/2006/customXml" ds:itemID="{FD85BFFF-2B6E-4D20-8938-61E36B8CFE89}">
   <ds:schemaRefs>
     <ds:schemaRef ds:uri="http://schemas.microsoft.com/office/2006/metadata/contentType"/>
@@ -13034,6 +13044,18 @@
 </ds:datastoreItem>
 </file>
 
+<file path=customXml/itemProps2.xml><?xml version="1.0" encoding="utf-8"?>
+<ds:datastoreItem xmlns:ds="http://schemas.openxmlformats.org/officeDocument/2006/customXml" ds:itemID="{AC069F72-2015-4FB6-9588-A49CB14BDC12}">
+  <ds:schemaRefs>
+    <ds:schemaRef ds:uri="http://schemas.microsoft.com/office/2006/metadata/properties"/>
+    <ds:schemaRef ds:uri="http://schemas.microsoft.com/office/infopath/2007/PartnerControls"/>
+    <ds:schemaRef ds:uri="71af3243-3dd4-4a8d-8c0d-dd76da1f02a5"/>
+    <ds:schemaRef ds:uri="http://schemas.microsoft.com/sharepoint/v3"/>
+    <ds:schemaRef ds:uri="230e9df3-be65-4c73-a93b-d1236ebd677e"/>
+  </ds:schemaRefs>
+</ds:datastoreItem>
+</file>
+
 <file path=customXml/itemProps3.xml><?xml version="1.0" encoding="utf-8"?>
 <ds:datastoreItem xmlns:ds="http://schemas.openxmlformats.org/officeDocument/2006/customXml" ds:itemID="{D6DA60BD-0042-4722-B671-D551884D1EED}">
   <ds:schemaRefs>

</xml_diff>

<commit_message>
feat: update powerpoint presentation
</commit_message>
<xml_diff>
--- a/devConf-2024-mfe.pptx
+++ b/devConf-2024-mfe.pptx
@@ -5,26 +5,30 @@
     <p:sldMasterId id="2147483670" r:id="rId4"/>
   </p:sldMasterIdLst>
   <p:notesMasterIdLst>
-    <p:notesMasterId r:id="rId19"/>
+    <p:notesMasterId r:id="rId23"/>
   </p:notesMasterIdLst>
   <p:handoutMasterIdLst>
-    <p:handoutMasterId r:id="rId20"/>
+    <p:handoutMasterId r:id="rId24"/>
   </p:handoutMasterIdLst>
   <p:sldIdLst>
     <p:sldId id="256" r:id="rId5"/>
     <p:sldId id="280" r:id="rId6"/>
     <p:sldId id="279" r:id="rId7"/>
     <p:sldId id="281" r:id="rId8"/>
-    <p:sldId id="292" r:id="rId9"/>
-    <p:sldId id="284" r:id="rId10"/>
-    <p:sldId id="282" r:id="rId11"/>
-    <p:sldId id="287" r:id="rId12"/>
-    <p:sldId id="289" r:id="rId13"/>
-    <p:sldId id="288" r:id="rId14"/>
-    <p:sldId id="290" r:id="rId15"/>
-    <p:sldId id="283" r:id="rId16"/>
-    <p:sldId id="291" r:id="rId17"/>
-    <p:sldId id="286" r:id="rId18"/>
+    <p:sldId id="293" r:id="rId9"/>
+    <p:sldId id="292" r:id="rId10"/>
+    <p:sldId id="284" r:id="rId11"/>
+    <p:sldId id="295" r:id="rId12"/>
+    <p:sldId id="294" r:id="rId13"/>
+    <p:sldId id="282" r:id="rId14"/>
+    <p:sldId id="287" r:id="rId15"/>
+    <p:sldId id="289" r:id="rId16"/>
+    <p:sldId id="296" r:id="rId17"/>
+    <p:sldId id="288" r:id="rId18"/>
+    <p:sldId id="290" r:id="rId19"/>
+    <p:sldId id="283" r:id="rId20"/>
+    <p:sldId id="291" r:id="rId21"/>
+    <p:sldId id="286" r:id="rId22"/>
   </p:sldIdLst>
   <p:sldSz cx="12192000" cy="6858000"/>
   <p:notesSz cx="6858000" cy="9144000"/>
@@ -1013,7 +1017,7 @@
           <a:p>
             <a:fld id="{3ED51245-A7A5-4517-A4C5-F741FAE668F7}" type="slidenum">
               <a:rPr lang="en-US" smtClean="0"/>
-              <a:t>6</a:t>
+              <a:t>7</a:t>
             </a:fld>
             <a:endParaRPr lang="en-US" dirty="0"/>
           </a:p>
@@ -1097,7 +1101,7 @@
           <a:p>
             <a:fld id="{3ED51245-A7A5-4517-A4C5-F741FAE668F7}" type="slidenum">
               <a:rPr lang="en-US" smtClean="0"/>
-              <a:t>7</a:t>
+              <a:t>10</a:t>
             </a:fld>
             <a:endParaRPr lang="en-US" dirty="0"/>
           </a:p>
@@ -1181,7 +1185,7 @@
           <a:p>
             <a:fld id="{3ED51245-A7A5-4517-A4C5-F741FAE668F7}" type="slidenum">
               <a:rPr lang="en-US" smtClean="0"/>
-              <a:t>12</a:t>
+              <a:t>16</a:t>
             </a:fld>
             <a:endParaRPr lang="en-US" dirty="0"/>
           </a:p>
@@ -1289,7 +1293,7 @@
           <a:p>
             <a:fld id="{3ED51245-A7A5-4517-A4C5-F741FAE668F7}" type="slidenum">
               <a:rPr lang="en-US" smtClean="0"/>
-              <a:t>13</a:t>
+              <a:t>17</a:t>
             </a:fld>
             <a:endParaRPr lang="en-US" dirty="0"/>
           </a:p>
@@ -1373,7 +1377,7 @@
           <a:p>
             <a:fld id="{D5ADF348-2A86-4531-BD4E-BD8C0BBDAD47}" type="slidenum">
               <a:rPr lang="en-US" smtClean="0"/>
-              <a:t>14</a:t>
+              <a:t>18</a:t>
             </a:fld>
             <a:endParaRPr lang="en-US" dirty="0"/>
           </a:p>
@@ -6984,6 +6988,1418 @@
     </p:bg>
     <p:spTree>
       <p:nvGrpSpPr>
+        <p:cNvPr id="1" name=""/>
+        <p:cNvGrpSpPr/>
+        <p:nvPr/>
+      </p:nvGrpSpPr>
+      <p:grpSpPr>
+        <a:xfrm>
+          <a:off x="0" y="0"/>
+          <a:ext cx="0" cy="0"/>
+          <a:chOff x="0" y="0"/>
+          <a:chExt cx="0" cy="0"/>
+        </a:xfrm>
+      </p:grpSpPr>
+      <p:sp>
+        <p:nvSpPr>
+          <p:cNvPr id="29" name="Rectangle 28">
+            <a:extLst>
+              <a:ext uri="{FF2B5EF4-FFF2-40B4-BE49-F238E27FC236}">
+                <a16:creationId xmlns:a16="http://schemas.microsoft.com/office/drawing/2014/main" id="{09A1C012-8297-4361-ACE8-A2509FB18911}"/>
+              </a:ext>
+              <a:ext uri="{C183D7F6-B498-43B3-948B-1728B52AA6E4}">
+                <adec:decorative xmlns:adec="http://schemas.microsoft.com/office/drawing/2017/decorative" val="1"/>
+              </a:ext>
+            </a:extLst>
+          </p:cNvPr>
+          <p:cNvSpPr>
+            <a:spLocks noGrp="1" noRot="1" noChangeAspect="1" noMove="1" noResize="1" noEditPoints="1" noAdjustHandles="1" noChangeArrowheads="1" noChangeShapeType="1" noTextEdit="1"/>
+          </p:cNvSpPr>
+          <p:nvPr>
+            <p:extLst>
+              <p:ext uri="{386F3935-93C4-4BCD-93E2-E3B085C9AB24}">
+                <p16:designElem xmlns:p16="http://schemas.microsoft.com/office/powerpoint/2015/main" val="1"/>
+              </p:ext>
+            </p:extLst>
+          </p:nvPr>
+        </p:nvSpPr>
+        <p:spPr>
+          <a:xfrm>
+            <a:off x="0" y="4206240"/>
+            <a:ext cx="12192000" cy="2651760"/>
+          </a:xfrm>
+          <a:prstGeom prst="rect">
+            <a:avLst/>
+          </a:prstGeom>
+          <a:solidFill>
+            <a:schemeClr val="tx1"/>
+          </a:solidFill>
+          <a:ln>
+            <a:noFill/>
+          </a:ln>
+        </p:spPr>
+        <p:style>
+          <a:lnRef idx="2">
+            <a:schemeClr val="accent1">
+              <a:shade val="50000"/>
+            </a:schemeClr>
+          </a:lnRef>
+          <a:fillRef idx="1">
+            <a:schemeClr val="accent1"/>
+          </a:fillRef>
+          <a:effectRef idx="0">
+            <a:schemeClr val="accent1"/>
+          </a:effectRef>
+          <a:fontRef idx="minor">
+            <a:schemeClr val="lt1"/>
+          </a:fontRef>
+        </p:style>
+        <p:txBody>
+          <a:bodyPr rtlCol="0" anchor="ctr"/>
+          <a:lstStyle/>
+          <a:p>
+            <a:pPr algn="ctr"/>
+            <a:endParaRPr lang="en-US"/>
+          </a:p>
+        </p:txBody>
+      </p:sp>
+      <p:sp useBgFill="1">
+        <p:nvSpPr>
+          <p:cNvPr id="31" name="Rectangle 30">
+            <a:extLst>
+              <a:ext uri="{FF2B5EF4-FFF2-40B4-BE49-F238E27FC236}">
+                <a16:creationId xmlns:a16="http://schemas.microsoft.com/office/drawing/2014/main" id="{4AA13AD3-0A4F-475A-BEBB-DEEFF5C096C3}"/>
+              </a:ext>
+              <a:ext uri="{C183D7F6-B498-43B3-948B-1728B52AA6E4}">
+                <adec:decorative xmlns:adec="http://schemas.microsoft.com/office/drawing/2017/decorative" val="1"/>
+              </a:ext>
+            </a:extLst>
+          </p:cNvPr>
+          <p:cNvSpPr>
+            <a:spLocks noGrp="1" noRot="1" noChangeAspect="1" noMove="1" noResize="1" noEditPoints="1" noAdjustHandles="1" noChangeArrowheads="1" noChangeShapeType="1" noTextEdit="1"/>
+          </p:cNvSpPr>
+          <p:nvPr>
+            <p:extLst>
+              <p:ext uri="{386F3935-93C4-4BCD-93E2-E3B085C9AB24}">
+                <p16:designElem xmlns:p16="http://schemas.microsoft.com/office/powerpoint/2015/main" val="1"/>
+              </p:ext>
+            </p:extLst>
+          </p:nvPr>
+        </p:nvSpPr>
+        <p:spPr>
+          <a:xfrm>
+            <a:off x="10510" y="0"/>
+            <a:ext cx="12188952" cy="6858000"/>
+          </a:xfrm>
+          <a:prstGeom prst="rect">
+            <a:avLst/>
+          </a:prstGeom>
+          <a:ln>
+            <a:noFill/>
+          </a:ln>
+        </p:spPr>
+        <p:style>
+          <a:lnRef idx="2">
+            <a:schemeClr val="accent1">
+              <a:shade val="50000"/>
+            </a:schemeClr>
+          </a:lnRef>
+          <a:fillRef idx="1">
+            <a:schemeClr val="accent1"/>
+          </a:fillRef>
+          <a:effectRef idx="0">
+            <a:schemeClr val="accent1"/>
+          </a:effectRef>
+          <a:fontRef idx="minor">
+            <a:schemeClr val="lt1"/>
+          </a:fontRef>
+        </p:style>
+        <p:txBody>
+          <a:bodyPr rtlCol="0" anchor="ctr"/>
+          <a:lstStyle/>
+          <a:p>
+            <a:pPr algn="ctr"/>
+            <a:endParaRPr lang="en-US"/>
+          </a:p>
+        </p:txBody>
+      </p:sp>
+      <p:sp>
+        <p:nvSpPr>
+          <p:cNvPr id="33" name="Rectangle 32">
+            <a:extLst>
+              <a:ext uri="{FF2B5EF4-FFF2-40B4-BE49-F238E27FC236}">
+                <a16:creationId xmlns:a16="http://schemas.microsoft.com/office/drawing/2014/main" id="{D65E0E3C-32F3-480B-9842-7611BBE2EE9F}"/>
+              </a:ext>
+              <a:ext uri="{C183D7F6-B498-43B3-948B-1728B52AA6E4}">
+                <adec:decorative xmlns:adec="http://schemas.microsoft.com/office/drawing/2017/decorative" val="1"/>
+              </a:ext>
+            </a:extLst>
+          </p:cNvPr>
+          <p:cNvSpPr>
+            <a:spLocks noGrp="1" noRot="1" noChangeAspect="1" noMove="1" noResize="1" noEditPoints="1" noAdjustHandles="1" noChangeArrowheads="1" noChangeShapeType="1" noTextEdit="1"/>
+          </p:cNvSpPr>
+          <p:nvPr>
+            <p:extLst>
+              <p:ext uri="{386F3935-93C4-4BCD-93E2-E3B085C9AB24}">
+                <p16:designElem xmlns:p16="http://schemas.microsoft.com/office/powerpoint/2015/main" val="1"/>
+              </p:ext>
+            </p:extLst>
+          </p:nvPr>
+        </p:nvSpPr>
+        <p:spPr>
+          <a:xfrm>
+            <a:off x="0" y="0"/>
+            <a:ext cx="7534655" cy="6858000"/>
+          </a:xfrm>
+          <a:prstGeom prst="rect">
+            <a:avLst/>
+          </a:prstGeom>
+          <a:solidFill>
+            <a:schemeClr val="tx1"/>
+          </a:solidFill>
+          <a:ln>
+            <a:noFill/>
+          </a:ln>
+        </p:spPr>
+        <p:style>
+          <a:lnRef idx="2">
+            <a:schemeClr val="accent1">
+              <a:shade val="50000"/>
+            </a:schemeClr>
+          </a:lnRef>
+          <a:fillRef idx="1">
+            <a:schemeClr val="accent1"/>
+          </a:fillRef>
+          <a:effectRef idx="0">
+            <a:schemeClr val="accent1"/>
+          </a:effectRef>
+          <a:fontRef idx="minor">
+            <a:schemeClr val="lt1"/>
+          </a:fontRef>
+        </p:style>
+        <p:txBody>
+          <a:bodyPr rtlCol="0" anchor="ctr"/>
+          <a:lstStyle/>
+          <a:p>
+            <a:pPr algn="ctr"/>
+            <a:endParaRPr lang="en-US"/>
+          </a:p>
+        </p:txBody>
+      </p:sp>
+      <p:sp>
+        <p:nvSpPr>
+          <p:cNvPr id="23" name="Title 22">
+            <a:extLst>
+              <a:ext uri="{FF2B5EF4-FFF2-40B4-BE49-F238E27FC236}">
+                <a16:creationId xmlns:a16="http://schemas.microsoft.com/office/drawing/2014/main" id="{CC69C1A1-78E3-4597-AE36-69056DA332BE}"/>
+              </a:ext>
+            </a:extLst>
+          </p:cNvPr>
+          <p:cNvSpPr>
+            <a:spLocks noGrp="1"/>
+          </p:cNvSpPr>
+          <p:nvPr>
+            <p:ph type="title"/>
+          </p:nvPr>
+        </p:nvSpPr>
+        <p:spPr>
+          <a:xfrm>
+            <a:off x="640079" y="640080"/>
+            <a:ext cx="6389027" cy="5569164"/>
+          </a:xfrm>
+        </p:spPr>
+        <p:txBody>
+          <a:bodyPr vert="horz" lIns="91440" tIns="45720" rIns="91440" bIns="45720" rtlCol="0" anchor="ctr">
+            <a:normAutofit/>
+          </a:bodyPr>
+          <a:lstStyle/>
+          <a:p>
+            <a:pPr algn="r"/>
+            <a:r>
+              <a:rPr lang="en-US" sz="8800"/>
+              <a:t>Case studies 🧳</a:t>
+            </a:r>
+          </a:p>
+        </p:txBody>
+      </p:sp>
+      <p:sp>
+        <p:nvSpPr>
+          <p:cNvPr id="24" name="Content Placeholder 23">
+            <a:extLst>
+              <a:ext uri="{FF2B5EF4-FFF2-40B4-BE49-F238E27FC236}">
+                <a16:creationId xmlns:a16="http://schemas.microsoft.com/office/drawing/2014/main" id="{D593D767-CBED-4343-BF82-E91FA5BF5521}"/>
+              </a:ext>
+            </a:extLst>
+          </p:cNvPr>
+          <p:cNvSpPr>
+            <a:spLocks noGrp="1"/>
+          </p:cNvSpPr>
+          <p:nvPr>
+            <p:ph idx="1"/>
+          </p:nvPr>
+        </p:nvSpPr>
+        <p:spPr>
+          <a:xfrm>
+            <a:off x="8029797" y="640079"/>
+            <a:ext cx="3199034" cy="5569165"/>
+          </a:xfrm>
+        </p:spPr>
+        <p:txBody>
+          <a:bodyPr vert="horz" lIns="91440" tIns="45720" rIns="91440" bIns="45720" rtlCol="0" anchor="ctr">
+            <a:normAutofit/>
+          </a:bodyPr>
+          <a:lstStyle/>
+          <a:p>
+            <a:r>
+              <a:rPr lang="en-US" sz="3600">
+                <a:solidFill>
+                  <a:schemeClr val="tx1"/>
+                </a:solidFill>
+              </a:rPr>
+              <a:t>Micro-frontends in de praktijk</a:t>
+            </a:r>
+          </a:p>
+        </p:txBody>
+      </p:sp>
+      <p:sp>
+        <p:nvSpPr>
+          <p:cNvPr id="7" name="Slide Number Placeholder 6">
+            <a:extLst>
+              <a:ext uri="{FF2B5EF4-FFF2-40B4-BE49-F238E27FC236}">
+                <a16:creationId xmlns:a16="http://schemas.microsoft.com/office/drawing/2014/main" id="{A352ABE0-11DD-496F-AD25-CB335771B694}"/>
+              </a:ext>
+            </a:extLst>
+          </p:cNvPr>
+          <p:cNvSpPr>
+            <a:spLocks noGrp="1"/>
+          </p:cNvSpPr>
+          <p:nvPr>
+            <p:ph type="sldNum" sz="quarter" idx="12"/>
+          </p:nvPr>
+        </p:nvSpPr>
+        <p:spPr>
+          <a:xfrm>
+            <a:off x="10296144" y="6356350"/>
+            <a:ext cx="932688" cy="365125"/>
+          </a:xfrm>
+        </p:spPr>
+        <p:txBody>
+          <a:bodyPr vert="horz" lIns="91440" tIns="45720" rIns="91440" bIns="45720" rtlCol="0" anchor="ctr">
+            <a:normAutofit/>
+          </a:bodyPr>
+          <a:lstStyle/>
+          <a:p>
+            <a:pPr algn="l">
+              <a:spcAft>
+                <a:spcPts val="600"/>
+              </a:spcAft>
+            </a:pPr>
+            <a:fld id="{294A09A9-5501-47C1-A89A-A340965A2BE2}" type="slidenum">
+              <a:rPr lang="en-US">
+                <a:solidFill>
+                  <a:schemeClr val="tx1"/>
+                </a:solidFill>
+              </a:rPr>
+              <a:pPr algn="l">
+                <a:spcAft>
+                  <a:spcPts val="600"/>
+                </a:spcAft>
+              </a:pPr>
+              <a:t>10</a:t>
+            </a:fld>
+            <a:endParaRPr lang="en-US">
+              <a:solidFill>
+                <a:schemeClr val="tx1"/>
+              </a:solidFill>
+            </a:endParaRPr>
+          </a:p>
+        </p:txBody>
+      </p:sp>
+    </p:spTree>
+    <p:extLst>
+      <p:ext uri="{BB962C8B-B14F-4D97-AF65-F5344CB8AC3E}">
+        <p14:creationId xmlns:p14="http://schemas.microsoft.com/office/powerpoint/2010/main" val="3392440280"/>
+      </p:ext>
+    </p:extLst>
+  </p:cSld>
+  <p:clrMapOvr>
+    <a:masterClrMapping/>
+  </p:clrMapOvr>
+  <p:timing>
+    <p:tnLst>
+      <p:par>
+        <p:cTn id="1" dur="indefinite" restart="never" nodeType="tmRoot">
+          <p:childTnLst>
+            <p:seq concurrent="1" nextAc="seek">
+              <p:cTn id="2" dur="indefinite" nodeType="mainSeq">
+                <p:childTnLst>
+                  <p:par>
+                    <p:cTn id="3" fill="hold">
+                      <p:stCondLst>
+                        <p:cond delay="indefinite"/>
+                        <p:cond evt="onBegin" delay="0">
+                          <p:tn val="2"/>
+                        </p:cond>
+                      </p:stCondLst>
+                      <p:childTnLst>
+                        <p:par>
+                          <p:cTn id="4" fill="hold">
+                            <p:stCondLst>
+                              <p:cond delay="0"/>
+                            </p:stCondLst>
+                            <p:childTnLst>
+                              <p:par>
+                                <p:cTn id="5" presetID="10" presetClass="entr" presetSubtype="0" fill="hold" grpId="0" nodeType="withEffect">
+                                  <p:stCondLst>
+                                    <p:cond delay="500"/>
+                                  </p:stCondLst>
+                                  <p:iterate type="lt">
+                                    <p:tmPct val="10000"/>
+                                  </p:iterate>
+                                  <p:childTnLst>
+                                    <p:set>
+                                      <p:cBhvr>
+                                        <p:cTn id="6" dur="1" fill="hold">
+                                          <p:stCondLst>
+                                            <p:cond delay="0"/>
+                                          </p:stCondLst>
+                                        </p:cTn>
+                                        <p:tgtEl>
+                                          <p:spTgt spid="23"/>
+                                        </p:tgtEl>
+                                        <p:attrNameLst>
+                                          <p:attrName>style.visibility</p:attrName>
+                                        </p:attrNameLst>
+                                      </p:cBhvr>
+                                      <p:to>
+                                        <p:strVal val="visible"/>
+                                      </p:to>
+                                    </p:set>
+                                    <p:animEffect transition="in" filter="fade">
+                                      <p:cBhvr>
+                                        <p:cTn id="7" dur="400"/>
+                                        <p:tgtEl>
+                                          <p:spTgt spid="23"/>
+                                        </p:tgtEl>
+                                      </p:cBhvr>
+                                    </p:animEffect>
+                                  </p:childTnLst>
+                                </p:cTn>
+                              </p:par>
+                            </p:childTnLst>
+                          </p:cTn>
+                        </p:par>
+                      </p:childTnLst>
+                    </p:cTn>
+                  </p:par>
+                </p:childTnLst>
+              </p:cTn>
+              <p:prevCondLst>
+                <p:cond evt="onPrev" delay="0">
+                  <p:tgtEl>
+                    <p:sldTgt/>
+                  </p:tgtEl>
+                </p:cond>
+              </p:prevCondLst>
+              <p:nextCondLst>
+                <p:cond evt="onNext" delay="0">
+                  <p:tgtEl>
+                    <p:sldTgt/>
+                  </p:tgtEl>
+                </p:cond>
+              </p:nextCondLst>
+            </p:seq>
+          </p:childTnLst>
+        </p:cTn>
+      </p:par>
+    </p:tnLst>
+    <p:bldLst>
+      <p:bldP spid="23" grpId="0"/>
+    </p:bldLst>
+  </p:timing>
+</p:sld>
+</file>
+
+<file path=ppt/slides/slide11.xml><?xml version="1.0" encoding="utf-8"?>
+<p:sld xmlns:a="http://schemas.openxmlformats.org/drawingml/2006/main" xmlns:r="http://schemas.openxmlformats.org/officeDocument/2006/relationships" xmlns:p="http://schemas.openxmlformats.org/presentationml/2006/main">
+  <p:cSld>
+    <p:bg>
+      <p:bgPr>
+        <a:solidFill>
+          <a:schemeClr val="bg1"/>
+        </a:solidFill>
+        <a:effectLst/>
+      </p:bgPr>
+    </p:bg>
+    <p:spTree>
+      <p:nvGrpSpPr>
+        <p:cNvPr id="1" name=""/>
+        <p:cNvGrpSpPr/>
+        <p:nvPr/>
+      </p:nvGrpSpPr>
+      <p:grpSpPr>
+        <a:xfrm>
+          <a:off x="0" y="0"/>
+          <a:ext cx="0" cy="0"/>
+          <a:chOff x="0" y="0"/>
+          <a:chExt cx="0" cy="0"/>
+        </a:xfrm>
+      </p:grpSpPr>
+      <p:sp>
+        <p:nvSpPr>
+          <p:cNvPr id="28" name="Rectangle 27">
+            <a:extLst>
+              <a:ext uri="{FF2B5EF4-FFF2-40B4-BE49-F238E27FC236}">
+                <a16:creationId xmlns:a16="http://schemas.microsoft.com/office/drawing/2014/main" id="{09A1C012-8297-4361-ACE8-A2509FB18911}"/>
+              </a:ext>
+              <a:ext uri="{C183D7F6-B498-43B3-948B-1728B52AA6E4}">
+                <adec:decorative xmlns:adec="http://schemas.microsoft.com/office/drawing/2017/decorative" val="1"/>
+              </a:ext>
+            </a:extLst>
+          </p:cNvPr>
+          <p:cNvSpPr>
+            <a:spLocks noGrp="1" noRot="1" noChangeAspect="1" noMove="1" noResize="1" noEditPoints="1" noAdjustHandles="1" noChangeArrowheads="1" noChangeShapeType="1" noTextEdit="1"/>
+          </p:cNvSpPr>
+          <p:nvPr>
+            <p:extLst>
+              <p:ext uri="{386F3935-93C4-4BCD-93E2-E3B085C9AB24}">
+                <p16:designElem xmlns:p16="http://schemas.microsoft.com/office/powerpoint/2015/main" val="1"/>
+              </p:ext>
+            </p:extLst>
+          </p:nvPr>
+        </p:nvSpPr>
+        <p:spPr>
+          <a:xfrm>
+            <a:off x="0" y="4206240"/>
+            <a:ext cx="12192000" cy="2651760"/>
+          </a:xfrm>
+          <a:prstGeom prst="rect">
+            <a:avLst/>
+          </a:prstGeom>
+          <a:solidFill>
+            <a:schemeClr val="tx1"/>
+          </a:solidFill>
+          <a:ln>
+            <a:noFill/>
+          </a:ln>
+        </p:spPr>
+        <p:style>
+          <a:lnRef idx="2">
+            <a:schemeClr val="accent1">
+              <a:shade val="50000"/>
+            </a:schemeClr>
+          </a:lnRef>
+          <a:fillRef idx="1">
+            <a:schemeClr val="accent1"/>
+          </a:fillRef>
+          <a:effectRef idx="0">
+            <a:schemeClr val="accent1"/>
+          </a:effectRef>
+          <a:fontRef idx="minor">
+            <a:schemeClr val="lt1"/>
+          </a:fontRef>
+        </p:style>
+        <p:txBody>
+          <a:bodyPr rtlCol="0" anchor="ctr"/>
+          <a:lstStyle/>
+          <a:p>
+            <a:pPr algn="ctr"/>
+            <a:endParaRPr lang="en-US"/>
+          </a:p>
+        </p:txBody>
+      </p:sp>
+      <p:sp useBgFill="1">
+        <p:nvSpPr>
+          <p:cNvPr id="30" name="Rectangle 29">
+            <a:extLst>
+              <a:ext uri="{FF2B5EF4-FFF2-40B4-BE49-F238E27FC236}">
+                <a16:creationId xmlns:a16="http://schemas.microsoft.com/office/drawing/2014/main" id="{4AA13AD3-0A4F-475A-BEBB-DEEFF5C096C3}"/>
+              </a:ext>
+              <a:ext uri="{C183D7F6-B498-43B3-948B-1728B52AA6E4}">
+                <adec:decorative xmlns:adec="http://schemas.microsoft.com/office/drawing/2017/decorative" val="1"/>
+              </a:ext>
+            </a:extLst>
+          </p:cNvPr>
+          <p:cNvSpPr>
+            <a:spLocks noGrp="1" noRot="1" noChangeAspect="1" noMove="1" noResize="1" noEditPoints="1" noAdjustHandles="1" noChangeArrowheads="1" noChangeShapeType="1" noTextEdit="1"/>
+          </p:cNvSpPr>
+          <p:nvPr>
+            <p:extLst>
+              <p:ext uri="{386F3935-93C4-4BCD-93E2-E3B085C9AB24}">
+                <p16:designElem xmlns:p16="http://schemas.microsoft.com/office/powerpoint/2015/main" val="1"/>
+              </p:ext>
+            </p:extLst>
+          </p:nvPr>
+        </p:nvSpPr>
+        <p:spPr>
+          <a:xfrm>
+            <a:off x="0" y="0"/>
+            <a:ext cx="12192000" cy="6858000"/>
+          </a:xfrm>
+          <a:prstGeom prst="rect">
+            <a:avLst/>
+          </a:prstGeom>
+          <a:ln>
+            <a:noFill/>
+          </a:ln>
+        </p:spPr>
+        <p:style>
+          <a:lnRef idx="2">
+            <a:schemeClr val="accent1">
+              <a:shade val="50000"/>
+            </a:schemeClr>
+          </a:lnRef>
+          <a:fillRef idx="1">
+            <a:schemeClr val="accent1"/>
+          </a:fillRef>
+          <a:effectRef idx="0">
+            <a:schemeClr val="accent1"/>
+          </a:effectRef>
+          <a:fontRef idx="minor">
+            <a:schemeClr val="lt1"/>
+          </a:fontRef>
+        </p:style>
+        <p:txBody>
+          <a:bodyPr rtlCol="0" anchor="ctr"/>
+          <a:lstStyle/>
+          <a:p>
+            <a:pPr algn="ctr"/>
+            <a:endParaRPr lang="en-US"/>
+          </a:p>
+        </p:txBody>
+      </p:sp>
+      <p:sp>
+        <p:nvSpPr>
+          <p:cNvPr id="32" name="Rectangle 31">
+            <a:extLst>
+              <a:ext uri="{FF2B5EF4-FFF2-40B4-BE49-F238E27FC236}">
+                <a16:creationId xmlns:a16="http://schemas.microsoft.com/office/drawing/2014/main" id="{D65E0E3C-32F3-480B-9842-7611BBE2EE9F}"/>
+              </a:ext>
+              <a:ext uri="{C183D7F6-B498-43B3-948B-1728B52AA6E4}">
+                <adec:decorative xmlns:adec="http://schemas.microsoft.com/office/drawing/2017/decorative" val="1"/>
+              </a:ext>
+            </a:extLst>
+          </p:cNvPr>
+          <p:cNvSpPr>
+            <a:spLocks noGrp="1" noRot="1" noChangeAspect="1" noMove="1" noResize="1" noEditPoints="1" noAdjustHandles="1" noChangeArrowheads="1" noChangeShapeType="1" noTextEdit="1"/>
+          </p:cNvSpPr>
+          <p:nvPr>
+            <p:extLst>
+              <p:ext uri="{386F3935-93C4-4BCD-93E2-E3B085C9AB24}">
+                <p16:designElem xmlns:p16="http://schemas.microsoft.com/office/powerpoint/2015/main" val="1"/>
+              </p:ext>
+            </p:extLst>
+          </p:nvPr>
+        </p:nvSpPr>
+        <p:spPr>
+          <a:xfrm>
+            <a:off x="0" y="0"/>
+            <a:ext cx="12192000" cy="4206240"/>
+          </a:xfrm>
+          <a:prstGeom prst="rect">
+            <a:avLst/>
+          </a:prstGeom>
+          <a:solidFill>
+            <a:schemeClr val="tx1"/>
+          </a:solidFill>
+          <a:ln>
+            <a:noFill/>
+          </a:ln>
+        </p:spPr>
+        <p:style>
+          <a:lnRef idx="2">
+            <a:schemeClr val="accent1">
+              <a:shade val="50000"/>
+            </a:schemeClr>
+          </a:lnRef>
+          <a:fillRef idx="1">
+            <a:schemeClr val="accent1"/>
+          </a:fillRef>
+          <a:effectRef idx="0">
+            <a:schemeClr val="accent1"/>
+          </a:effectRef>
+          <a:fontRef idx="minor">
+            <a:schemeClr val="lt1"/>
+          </a:fontRef>
+        </p:style>
+        <p:txBody>
+          <a:bodyPr rtlCol="0" anchor="ctr"/>
+          <a:lstStyle/>
+          <a:p>
+            <a:pPr algn="ctr"/>
+            <a:endParaRPr lang="en-US"/>
+          </a:p>
+        </p:txBody>
+      </p:sp>
+      <p:sp>
+        <p:nvSpPr>
+          <p:cNvPr id="2" name="Titel 1">
+            <a:extLst>
+              <a:ext uri="{FF2B5EF4-FFF2-40B4-BE49-F238E27FC236}">
+                <a16:creationId xmlns:a16="http://schemas.microsoft.com/office/drawing/2014/main" id="{8D9583FE-B306-07EB-250E-9729557A9D7E}"/>
+              </a:ext>
+            </a:extLst>
+          </p:cNvPr>
+          <p:cNvSpPr>
+            <a:spLocks noGrp="1"/>
+          </p:cNvSpPr>
+          <p:nvPr>
+            <p:ph type="title"/>
+          </p:nvPr>
+        </p:nvSpPr>
+        <p:spPr>
+          <a:xfrm>
+            <a:off x="960120" y="640080"/>
+            <a:ext cx="10268712" cy="3227832"/>
+          </a:xfrm>
+        </p:spPr>
+        <p:txBody>
+          <a:bodyPr vert="horz" lIns="91440" tIns="45720" rIns="91440" bIns="45720" rtlCol="0" anchor="b">
+            <a:normAutofit/>
+          </a:bodyPr>
+          <a:lstStyle/>
+          <a:p>
+            <a:pPr algn="ctr"/>
+            <a:r>
+              <a:rPr lang="en-US" sz="8800" dirty="0"/>
+              <a:t>Spotify</a:t>
+            </a:r>
+          </a:p>
+        </p:txBody>
+      </p:sp>
+      <p:sp>
+        <p:nvSpPr>
+          <p:cNvPr id="5" name="Tijdelijke aanduiding voor dianummer 4">
+            <a:extLst>
+              <a:ext uri="{FF2B5EF4-FFF2-40B4-BE49-F238E27FC236}">
+                <a16:creationId xmlns:a16="http://schemas.microsoft.com/office/drawing/2014/main" id="{37522FDD-ED25-AE92-69CE-D1A8DA8B36EF}"/>
+              </a:ext>
+            </a:extLst>
+          </p:cNvPr>
+          <p:cNvSpPr>
+            <a:spLocks noGrp="1"/>
+          </p:cNvSpPr>
+          <p:nvPr>
+            <p:ph type="sldNum" sz="quarter" idx="12"/>
+          </p:nvPr>
+        </p:nvSpPr>
+        <p:spPr>
+          <a:xfrm>
+            <a:off x="10296144" y="6356350"/>
+            <a:ext cx="932688" cy="365125"/>
+          </a:xfrm>
+        </p:spPr>
+        <p:txBody>
+          <a:bodyPr vert="horz" lIns="91440" tIns="45720" rIns="91440" bIns="45720" rtlCol="0" anchor="ctr">
+            <a:normAutofit/>
+          </a:bodyPr>
+          <a:lstStyle/>
+          <a:p>
+            <a:pPr algn="l">
+              <a:spcAft>
+                <a:spcPts val="600"/>
+              </a:spcAft>
+            </a:pPr>
+            <a:fld id="{294A09A9-5501-47C1-A89A-A340965A2BE2}" type="slidenum">
+              <a:rPr lang="en-US">
+                <a:solidFill>
+                  <a:schemeClr val="tx1"/>
+                </a:solidFill>
+              </a:rPr>
+              <a:pPr algn="l">
+                <a:spcAft>
+                  <a:spcPts val="600"/>
+                </a:spcAft>
+              </a:pPr>
+              <a:t>11</a:t>
+            </a:fld>
+            <a:endParaRPr lang="en-US">
+              <a:solidFill>
+                <a:schemeClr val="tx1"/>
+              </a:solidFill>
+            </a:endParaRPr>
+          </a:p>
+        </p:txBody>
+      </p:sp>
+    </p:spTree>
+    <p:extLst>
+      <p:ext uri="{BB962C8B-B14F-4D97-AF65-F5344CB8AC3E}">
+        <p14:creationId xmlns:p14="http://schemas.microsoft.com/office/powerpoint/2010/main" val="1131219409"/>
+      </p:ext>
+    </p:extLst>
+  </p:cSld>
+  <p:clrMapOvr>
+    <a:masterClrMapping/>
+  </p:clrMapOvr>
+  <p:timing>
+    <p:tnLst>
+      <p:par>
+        <p:cTn id="1" dur="indefinite" restart="never" nodeType="tmRoot">
+          <p:childTnLst>
+            <p:seq concurrent="1" nextAc="seek">
+              <p:cTn id="2" dur="indefinite" nodeType="mainSeq">
+                <p:childTnLst>
+                  <p:par>
+                    <p:cTn id="3" fill="hold">
+                      <p:stCondLst>
+                        <p:cond delay="indefinite"/>
+                        <p:cond evt="onBegin" delay="0">
+                          <p:tn val="2"/>
+                        </p:cond>
+                      </p:stCondLst>
+                      <p:childTnLst>
+                        <p:par>
+                          <p:cTn id="4" fill="hold">
+                            <p:stCondLst>
+                              <p:cond delay="0"/>
+                            </p:stCondLst>
+                            <p:childTnLst>
+                              <p:par>
+                                <p:cTn id="5" presetID="10" presetClass="entr" presetSubtype="0" fill="hold" grpId="0" nodeType="withEffect">
+                                  <p:stCondLst>
+                                    <p:cond delay="500"/>
+                                  </p:stCondLst>
+                                  <p:iterate type="lt">
+                                    <p:tmPct val="10000"/>
+                                  </p:iterate>
+                                  <p:childTnLst>
+                                    <p:set>
+                                      <p:cBhvr>
+                                        <p:cTn id="6" dur="1" fill="hold">
+                                          <p:stCondLst>
+                                            <p:cond delay="0"/>
+                                          </p:stCondLst>
+                                        </p:cTn>
+                                        <p:tgtEl>
+                                          <p:spTgt spid="2"/>
+                                        </p:tgtEl>
+                                        <p:attrNameLst>
+                                          <p:attrName>style.visibility</p:attrName>
+                                        </p:attrNameLst>
+                                      </p:cBhvr>
+                                      <p:to>
+                                        <p:strVal val="visible"/>
+                                      </p:to>
+                                    </p:set>
+                                    <p:animEffect transition="in" filter="fade">
+                                      <p:cBhvr>
+                                        <p:cTn id="7" dur="400"/>
+                                        <p:tgtEl>
+                                          <p:spTgt spid="2"/>
+                                        </p:tgtEl>
+                                      </p:cBhvr>
+                                    </p:animEffect>
+                                  </p:childTnLst>
+                                </p:cTn>
+                              </p:par>
+                            </p:childTnLst>
+                          </p:cTn>
+                        </p:par>
+                      </p:childTnLst>
+                    </p:cTn>
+                  </p:par>
+                </p:childTnLst>
+              </p:cTn>
+              <p:prevCondLst>
+                <p:cond evt="onPrev" delay="0">
+                  <p:tgtEl>
+                    <p:sldTgt/>
+                  </p:tgtEl>
+                </p:cond>
+              </p:prevCondLst>
+              <p:nextCondLst>
+                <p:cond evt="onNext" delay="0">
+                  <p:tgtEl>
+                    <p:sldTgt/>
+                  </p:tgtEl>
+                </p:cond>
+              </p:nextCondLst>
+            </p:seq>
+          </p:childTnLst>
+        </p:cTn>
+      </p:par>
+    </p:tnLst>
+    <p:bldLst>
+      <p:bldP spid="2" grpId="0"/>
+    </p:bldLst>
+  </p:timing>
+</p:sld>
+</file>
+
+<file path=ppt/slides/slide12.xml><?xml version="1.0" encoding="utf-8"?>
+<p:sld xmlns:a="http://schemas.openxmlformats.org/drawingml/2006/main" xmlns:r="http://schemas.openxmlformats.org/officeDocument/2006/relationships" xmlns:p="http://schemas.openxmlformats.org/presentationml/2006/main">
+  <p:cSld>
+    <p:bg>
+      <p:bgPr>
+        <a:solidFill>
+          <a:schemeClr val="bg1"/>
+        </a:solidFill>
+        <a:effectLst/>
+      </p:bgPr>
+    </p:bg>
+    <p:spTree>
+      <p:nvGrpSpPr>
+        <p:cNvPr id="1" name=""/>
+        <p:cNvGrpSpPr/>
+        <p:nvPr/>
+      </p:nvGrpSpPr>
+      <p:grpSpPr>
+        <a:xfrm>
+          <a:off x="0" y="0"/>
+          <a:ext cx="0" cy="0"/>
+          <a:chOff x="0" y="0"/>
+          <a:chExt cx="0" cy="0"/>
+        </a:xfrm>
+      </p:grpSpPr>
+      <p:sp useBgFill="1">
+        <p:nvSpPr>
+          <p:cNvPr id="1052" name="Rectangle 1047">
+            <a:extLst>
+              <a:ext uri="{FF2B5EF4-FFF2-40B4-BE49-F238E27FC236}">
+                <a16:creationId xmlns:a16="http://schemas.microsoft.com/office/drawing/2014/main" id="{6BC377B7-18F1-42AD-A1DD-E1D6A5B27CE9}"/>
+              </a:ext>
+              <a:ext uri="{C183D7F6-B498-43B3-948B-1728B52AA6E4}">
+                <adec:decorative xmlns:adec="http://schemas.microsoft.com/office/drawing/2017/decorative" val="1"/>
+              </a:ext>
+            </a:extLst>
+          </p:cNvPr>
+          <p:cNvSpPr>
+            <a:spLocks noGrp="1" noRot="1" noChangeAspect="1" noMove="1" noResize="1" noEditPoints="1" noAdjustHandles="1" noChangeArrowheads="1" noChangeShapeType="1" noTextEdit="1"/>
+          </p:cNvSpPr>
+          <p:nvPr>
+            <p:extLst>
+              <p:ext uri="{386F3935-93C4-4BCD-93E2-E3B085C9AB24}">
+                <p16:designElem xmlns:p16="http://schemas.microsoft.com/office/powerpoint/2015/main" val="1"/>
+              </p:ext>
+            </p:extLst>
+          </p:nvPr>
+        </p:nvSpPr>
+        <p:spPr>
+          <a:xfrm>
+            <a:off x="0" y="0"/>
+            <a:ext cx="12192000" cy="6858000"/>
+          </a:xfrm>
+          <a:prstGeom prst="rect">
+            <a:avLst/>
+          </a:prstGeom>
+          <a:ln>
+            <a:noFill/>
+          </a:ln>
+        </p:spPr>
+        <p:style>
+          <a:lnRef idx="2">
+            <a:schemeClr val="accent1">
+              <a:shade val="50000"/>
+            </a:schemeClr>
+          </a:lnRef>
+          <a:fillRef idx="1">
+            <a:schemeClr val="accent1"/>
+          </a:fillRef>
+          <a:effectRef idx="0">
+            <a:schemeClr val="accent1"/>
+          </a:effectRef>
+          <a:fontRef idx="minor">
+            <a:schemeClr val="lt1"/>
+          </a:fontRef>
+        </p:style>
+        <p:txBody>
+          <a:bodyPr rtlCol="0" anchor="ctr"/>
+          <a:lstStyle/>
+          <a:p>
+            <a:pPr algn="ctr"/>
+            <a:endParaRPr lang="en-US"/>
+          </a:p>
+        </p:txBody>
+      </p:sp>
+      <p:pic>
+        <p:nvPicPr>
+          <p:cNvPr id="1026" name="Picture 2" descr="Micro Frontend; Spotify Web UI">
+            <a:extLst>
+              <a:ext uri="{FF2B5EF4-FFF2-40B4-BE49-F238E27FC236}">
+                <a16:creationId xmlns:a16="http://schemas.microsoft.com/office/drawing/2014/main" id="{51112E7E-F096-6074-954D-C58B345597CE}"/>
+              </a:ext>
+            </a:extLst>
+          </p:cNvPr>
+          <p:cNvPicPr>
+            <a:picLocks noChangeAspect="1" noChangeArrowheads="1"/>
+          </p:cNvPicPr>
+          <p:nvPr/>
+        </p:nvPicPr>
+        <p:blipFill rotWithShape="1">
+          <a:blip r:embed="rId2">
+            <a:extLst>
+              <a:ext uri="{28A0092B-C50C-407E-A947-70E740481C1C}">
+                <a14:useLocalDpi xmlns:a14="http://schemas.microsoft.com/office/drawing/2010/main" val="0"/>
+              </a:ext>
+            </a:extLst>
+          </a:blip>
+          <a:srcRect r="8444" b="-1"/>
+          <a:stretch/>
+        </p:blipFill>
+        <p:spPr bwMode="auto">
+          <a:xfrm>
+            <a:off x="1519162" y="1458685"/>
+            <a:ext cx="9153675" cy="5148943"/>
+          </a:xfrm>
+          <a:prstGeom prst="rect">
+            <a:avLst/>
+          </a:prstGeom>
+          <a:noFill/>
+          <a:extLst>
+            <a:ext uri="{909E8E84-426E-40DD-AFC4-6F175D3DCCD1}">
+              <a14:hiddenFill xmlns:a14="http://schemas.microsoft.com/office/drawing/2010/main">
+                <a:solidFill>
+                  <a:srgbClr val="FFFFFF"/>
+                </a:solidFill>
+              </a14:hiddenFill>
+            </a:ext>
+          </a:extLst>
+        </p:spPr>
+      </p:pic>
+      <p:sp>
+        <p:nvSpPr>
+          <p:cNvPr id="8" name="Title 22">
+            <a:extLst>
+              <a:ext uri="{FF2B5EF4-FFF2-40B4-BE49-F238E27FC236}">
+                <a16:creationId xmlns:a16="http://schemas.microsoft.com/office/drawing/2014/main" id="{07F0AAEC-9371-5310-B8E0-8D793FDE0D0C}"/>
+              </a:ext>
+            </a:extLst>
+          </p:cNvPr>
+          <p:cNvSpPr>
+            <a:spLocks noGrp="1"/>
+          </p:cNvSpPr>
+          <p:nvPr>
+            <p:ph type="title"/>
+          </p:nvPr>
+        </p:nvSpPr>
+        <p:spPr>
+          <a:xfrm>
+            <a:off x="0" y="0"/>
+            <a:ext cx="12192000" cy="1458685"/>
+          </a:xfrm>
+        </p:spPr>
+        <p:txBody>
+          <a:bodyPr vert="horz" lIns="91440" tIns="45720" rIns="91440" bIns="45720" rtlCol="0" anchor="ctr">
+            <a:normAutofit/>
+          </a:bodyPr>
+          <a:lstStyle/>
+          <a:p>
+            <a:pPr algn="ctr"/>
+            <a:r>
+              <a:rPr lang="en-US" sz="5400" dirty="0" err="1">
+                <a:solidFill>
+                  <a:schemeClr val="tx1"/>
+                </a:solidFill>
+              </a:rPr>
+              <a:t>iframe</a:t>
+            </a:r>
+            <a:r>
+              <a:rPr lang="en-US" sz="5400" dirty="0">
+                <a:solidFill>
+                  <a:schemeClr val="tx1"/>
+                </a:solidFill>
+              </a:rPr>
+              <a:t> </a:t>
+            </a:r>
+            <a:r>
+              <a:rPr lang="en-US" sz="5400" dirty="0" err="1">
+                <a:solidFill>
+                  <a:schemeClr val="tx1"/>
+                </a:solidFill>
+              </a:rPr>
+              <a:t>integratie</a:t>
+            </a:r>
+            <a:endParaRPr lang="en-US" sz="5400" dirty="0">
+              <a:solidFill>
+                <a:schemeClr val="tx1"/>
+              </a:solidFill>
+            </a:endParaRPr>
+          </a:p>
+        </p:txBody>
+      </p:sp>
+    </p:spTree>
+    <p:extLst>
+      <p:ext uri="{BB962C8B-B14F-4D97-AF65-F5344CB8AC3E}">
+        <p14:creationId xmlns:p14="http://schemas.microsoft.com/office/powerpoint/2010/main" val="999340151"/>
+      </p:ext>
+    </p:extLst>
+  </p:cSld>
+  <p:clrMapOvr>
+    <a:masterClrMapping/>
+  </p:clrMapOvr>
+  <p:timing>
+    <p:tnLst>
+      <p:par>
+        <p:cTn id="1" dur="indefinite" restart="never" nodeType="tmRoot">
+          <p:childTnLst>
+            <p:seq concurrent="1" nextAc="seek">
+              <p:cTn id="2" dur="indefinite" nodeType="mainSeq">
+                <p:childTnLst>
+                  <p:par>
+                    <p:cTn id="3" fill="hold">
+                      <p:stCondLst>
+                        <p:cond delay="indefinite"/>
+                        <p:cond evt="onBegin" delay="0">
+                          <p:tn val="2"/>
+                        </p:cond>
+                      </p:stCondLst>
+                      <p:childTnLst>
+                        <p:par>
+                          <p:cTn id="4" fill="hold">
+                            <p:stCondLst>
+                              <p:cond delay="0"/>
+                            </p:stCondLst>
+                            <p:childTnLst>
+                              <p:par>
+                                <p:cTn id="5" presetID="10" presetClass="entr" presetSubtype="0" fill="hold" grpId="0" nodeType="withEffect">
+                                  <p:stCondLst>
+                                    <p:cond delay="500"/>
+                                  </p:stCondLst>
+                                  <p:iterate>
+                                    <p:tmPct val="10000"/>
+                                  </p:iterate>
+                                  <p:childTnLst>
+                                    <p:set>
+                                      <p:cBhvr>
+                                        <p:cTn id="6" dur="1" fill="hold">
+                                          <p:stCondLst>
+                                            <p:cond delay="0"/>
+                                          </p:stCondLst>
+                                        </p:cTn>
+                                        <p:tgtEl>
+                                          <p:spTgt spid="8"/>
+                                        </p:tgtEl>
+                                        <p:attrNameLst>
+                                          <p:attrName>style.visibility</p:attrName>
+                                        </p:attrNameLst>
+                                      </p:cBhvr>
+                                      <p:to>
+                                        <p:strVal val="visible"/>
+                                      </p:to>
+                                    </p:set>
+                                    <p:animEffect transition="in" filter="fade">
+                                      <p:cBhvr>
+                                        <p:cTn id="7" dur="700"/>
+                                        <p:tgtEl>
+                                          <p:spTgt spid="8"/>
+                                        </p:tgtEl>
+                                      </p:cBhvr>
+                                    </p:animEffect>
+                                  </p:childTnLst>
+                                </p:cTn>
+                              </p:par>
+                            </p:childTnLst>
+                          </p:cTn>
+                        </p:par>
+                      </p:childTnLst>
+                    </p:cTn>
+                  </p:par>
+                </p:childTnLst>
+              </p:cTn>
+              <p:prevCondLst>
+                <p:cond evt="onPrev" delay="0">
+                  <p:tgtEl>
+                    <p:sldTgt/>
+                  </p:tgtEl>
+                </p:cond>
+              </p:prevCondLst>
+              <p:nextCondLst>
+                <p:cond evt="onNext" delay="0">
+                  <p:tgtEl>
+                    <p:sldTgt/>
+                  </p:tgtEl>
+                </p:cond>
+              </p:nextCondLst>
+            </p:seq>
+          </p:childTnLst>
+        </p:cTn>
+      </p:par>
+    </p:tnLst>
+    <p:bldLst>
+      <p:bldP spid="8" grpId="0"/>
+    </p:bldLst>
+  </p:timing>
+</p:sld>
+</file>
+
+<file path=ppt/slides/slide13.xml><?xml version="1.0" encoding="utf-8"?>
+<p:sld xmlns:a="http://schemas.openxmlformats.org/drawingml/2006/main" xmlns:r="http://schemas.openxmlformats.org/officeDocument/2006/relationships" xmlns:p="http://schemas.openxmlformats.org/presentationml/2006/main">
+  <p:cSld>
+    <p:bg>
+      <p:bgPr>
+        <a:solidFill>
+          <a:schemeClr val="bg1"/>
+        </a:solidFill>
+        <a:effectLst/>
+      </p:bgPr>
+    </p:bg>
+    <p:spTree>
+      <p:nvGrpSpPr>
+        <p:cNvPr id="1" name="">
+          <a:extLst>
+            <a:ext uri="{FF2B5EF4-FFF2-40B4-BE49-F238E27FC236}">
+              <a16:creationId xmlns:a16="http://schemas.microsoft.com/office/drawing/2014/main" id="{CF08F2C8-74F5-92FA-49D3-A23B6AE53218}"/>
+            </a:ext>
+          </a:extLst>
+        </p:cNvPr>
+        <p:cNvGrpSpPr/>
+        <p:nvPr/>
+      </p:nvGrpSpPr>
+      <p:grpSpPr>
+        <a:xfrm>
+          <a:off x="0" y="0"/>
+          <a:ext cx="0" cy="0"/>
+          <a:chOff x="0" y="0"/>
+          <a:chExt cx="0" cy="0"/>
+        </a:xfrm>
+      </p:grpSpPr>
+      <p:sp useBgFill="1">
+        <p:nvSpPr>
+          <p:cNvPr id="6" name="Rectangle 7">
+            <a:extLst>
+              <a:ext uri="{FF2B5EF4-FFF2-40B4-BE49-F238E27FC236}">
+                <a16:creationId xmlns:a16="http://schemas.microsoft.com/office/drawing/2014/main" id="{6BC377B7-18F1-42AD-A1DD-E1D6A5B27CE9}"/>
+              </a:ext>
+              <a:ext uri="{C183D7F6-B498-43B3-948B-1728B52AA6E4}">
+                <adec:decorative xmlns:adec="http://schemas.microsoft.com/office/drawing/2017/decorative" val="1"/>
+              </a:ext>
+            </a:extLst>
+          </p:cNvPr>
+          <p:cNvSpPr>
+            <a:spLocks noGrp="1" noRot="1" noChangeAspect="1" noMove="1" noResize="1" noEditPoints="1" noAdjustHandles="1" noChangeArrowheads="1" noChangeShapeType="1" noTextEdit="1"/>
+          </p:cNvSpPr>
+          <p:nvPr>
+            <p:extLst>
+              <p:ext uri="{386F3935-93C4-4BCD-93E2-E3B085C9AB24}">
+                <p16:designElem xmlns:p16="http://schemas.microsoft.com/office/powerpoint/2015/main" val="1"/>
+              </p:ext>
+            </p:extLst>
+          </p:nvPr>
+        </p:nvSpPr>
+        <p:spPr>
+          <a:xfrm>
+            <a:off x="0" y="0"/>
+            <a:ext cx="12192000" cy="6858000"/>
+          </a:xfrm>
+          <a:prstGeom prst="rect">
+            <a:avLst/>
+          </a:prstGeom>
+          <a:ln>
+            <a:noFill/>
+          </a:ln>
+        </p:spPr>
+        <p:style>
+          <a:lnRef idx="2">
+            <a:schemeClr val="accent1">
+              <a:shade val="50000"/>
+            </a:schemeClr>
+          </a:lnRef>
+          <a:fillRef idx="1">
+            <a:schemeClr val="accent1"/>
+          </a:fillRef>
+          <a:effectRef idx="0">
+            <a:schemeClr val="accent1"/>
+          </a:effectRef>
+          <a:fontRef idx="minor">
+            <a:schemeClr val="lt1"/>
+          </a:fontRef>
+        </p:style>
+        <p:txBody>
+          <a:bodyPr rtlCol="0" anchor="ctr"/>
+          <a:lstStyle/>
+          <a:p>
+            <a:pPr algn="ctr"/>
+            <a:endParaRPr lang="en-US"/>
+          </a:p>
+        </p:txBody>
+      </p:sp>
+      <p:pic>
+        <p:nvPicPr>
+          <p:cNvPr id="3" name="Afbeelding 2">
+            <a:extLst>
+              <a:ext uri="{FF2B5EF4-FFF2-40B4-BE49-F238E27FC236}">
+                <a16:creationId xmlns:a16="http://schemas.microsoft.com/office/drawing/2014/main" id="{4B0EF5AF-EBC4-BA2D-DC7F-7BDAD79F66C2}"/>
+              </a:ext>
+            </a:extLst>
+          </p:cNvPr>
+          <p:cNvPicPr>
+            <a:picLocks noChangeAspect="1"/>
+          </p:cNvPicPr>
+          <p:nvPr/>
+        </p:nvPicPr>
+        <p:blipFill>
+          <a:blip r:embed="rId2"/>
+          <a:stretch>
+            <a:fillRect/>
+          </a:stretch>
+        </p:blipFill>
+        <p:spPr>
+          <a:xfrm>
+            <a:off x="643467" y="1690290"/>
+            <a:ext cx="10905066" cy="3477420"/>
+          </a:xfrm>
+          <a:prstGeom prst="rect">
+            <a:avLst/>
+          </a:prstGeom>
+        </p:spPr>
+      </p:pic>
+      <p:sp>
+        <p:nvSpPr>
+          <p:cNvPr id="7" name="Title 22">
+            <a:extLst>
+              <a:ext uri="{FF2B5EF4-FFF2-40B4-BE49-F238E27FC236}">
+                <a16:creationId xmlns:a16="http://schemas.microsoft.com/office/drawing/2014/main" id="{E56AC4A3-8F9F-C2A6-E0B5-DCD4C0AB51D3}"/>
+              </a:ext>
+            </a:extLst>
+          </p:cNvPr>
+          <p:cNvSpPr>
+            <a:spLocks noGrp="1"/>
+          </p:cNvSpPr>
+          <p:nvPr>
+            <p:ph type="title"/>
+          </p:nvPr>
+        </p:nvSpPr>
+        <p:spPr>
+          <a:xfrm>
+            <a:off x="643467" y="0"/>
+            <a:ext cx="10553070" cy="1458685"/>
+          </a:xfrm>
+        </p:spPr>
+        <p:txBody>
+          <a:bodyPr vert="horz" lIns="91440" tIns="45720" rIns="91440" bIns="45720" rtlCol="0" anchor="ctr">
+            <a:normAutofit/>
+          </a:bodyPr>
+          <a:lstStyle/>
+          <a:p>
+            <a:r>
+              <a:rPr lang="en-US" sz="2800" dirty="0">
+                <a:solidFill>
+                  <a:schemeClr val="tx1"/>
+                </a:solidFill>
+              </a:rPr>
+              <a:t>Spotify dev comment:</a:t>
+            </a:r>
+          </a:p>
+        </p:txBody>
+      </p:sp>
+    </p:spTree>
+    <p:extLst>
+      <p:ext uri="{BB962C8B-B14F-4D97-AF65-F5344CB8AC3E}">
+        <p14:creationId xmlns:p14="http://schemas.microsoft.com/office/powerpoint/2010/main" val="629360624"/>
+      </p:ext>
+    </p:extLst>
+  </p:cSld>
+  <p:clrMapOvr>
+    <a:masterClrMapping/>
+  </p:clrMapOvr>
+  <p:timing>
+    <p:tnLst>
+      <p:par>
+        <p:cTn id="1" dur="indefinite" restart="never" nodeType="tmRoot">
+          <p:childTnLst>
+            <p:seq concurrent="1" nextAc="seek">
+              <p:cTn id="2" dur="indefinite" nodeType="mainSeq">
+                <p:childTnLst>
+                  <p:par>
+                    <p:cTn id="3" fill="hold">
+                      <p:stCondLst>
+                        <p:cond delay="indefinite"/>
+                        <p:cond evt="onBegin" delay="0">
+                          <p:tn val="2"/>
+                        </p:cond>
+                      </p:stCondLst>
+                      <p:childTnLst>
+                        <p:par>
+                          <p:cTn id="4" fill="hold">
+                            <p:stCondLst>
+                              <p:cond delay="0"/>
+                            </p:stCondLst>
+                            <p:childTnLst>
+                              <p:par>
+                                <p:cTn id="5" presetID="10" presetClass="entr" presetSubtype="0" fill="hold" grpId="0" nodeType="withEffect">
+                                  <p:stCondLst>
+                                    <p:cond delay="500"/>
+                                  </p:stCondLst>
+                                  <p:iterate>
+                                    <p:tmPct val="10000"/>
+                                  </p:iterate>
+                                  <p:childTnLst>
+                                    <p:set>
+                                      <p:cBhvr>
+                                        <p:cTn id="6" dur="1" fill="hold">
+                                          <p:stCondLst>
+                                            <p:cond delay="0"/>
+                                          </p:stCondLst>
+                                        </p:cTn>
+                                        <p:tgtEl>
+                                          <p:spTgt spid="7"/>
+                                        </p:tgtEl>
+                                        <p:attrNameLst>
+                                          <p:attrName>style.visibility</p:attrName>
+                                        </p:attrNameLst>
+                                      </p:cBhvr>
+                                      <p:to>
+                                        <p:strVal val="visible"/>
+                                      </p:to>
+                                    </p:set>
+                                    <p:animEffect transition="in" filter="fade">
+                                      <p:cBhvr>
+                                        <p:cTn id="7" dur="700"/>
+                                        <p:tgtEl>
+                                          <p:spTgt spid="7"/>
+                                        </p:tgtEl>
+                                      </p:cBhvr>
+                                    </p:animEffect>
+                                  </p:childTnLst>
+                                </p:cTn>
+                              </p:par>
+                            </p:childTnLst>
+                          </p:cTn>
+                        </p:par>
+                      </p:childTnLst>
+                    </p:cTn>
+                  </p:par>
+                </p:childTnLst>
+              </p:cTn>
+              <p:prevCondLst>
+                <p:cond evt="onPrev" delay="0">
+                  <p:tgtEl>
+                    <p:sldTgt/>
+                  </p:tgtEl>
+                </p:cond>
+              </p:prevCondLst>
+              <p:nextCondLst>
+                <p:cond evt="onNext" delay="0">
+                  <p:tgtEl>
+                    <p:sldTgt/>
+                  </p:tgtEl>
+                </p:cond>
+              </p:nextCondLst>
+            </p:seq>
+          </p:childTnLst>
+        </p:cTn>
+      </p:par>
+    </p:tnLst>
+    <p:bldLst>
+      <p:bldP spid="7" grpId="0"/>
+    </p:bldLst>
+  </p:timing>
+</p:sld>
+</file>
+
+<file path=ppt/slides/slide14.xml><?xml version="1.0" encoding="utf-8"?>
+<p:sld xmlns:a="http://schemas.openxmlformats.org/drawingml/2006/main" xmlns:r="http://schemas.openxmlformats.org/officeDocument/2006/relationships" xmlns:p="http://schemas.openxmlformats.org/presentationml/2006/main">
+  <p:cSld>
+    <p:bg>
+      <p:bgPr>
+        <a:solidFill>
+          <a:schemeClr val="bg1"/>
+        </a:solidFill>
+        <a:effectLst/>
+      </p:bgPr>
+    </p:bg>
+    <p:spTree>
+      <p:nvGrpSpPr>
         <p:cNvPr id="1" name="">
           <a:extLst>
             <a:ext uri="{FF2B5EF4-FFF2-40B4-BE49-F238E27FC236}">
@@ -7269,7 +8685,7 @@
                   <a:spcPts val="600"/>
                 </a:spcAft>
               </a:pPr>
-              <a:t>10</a:t>
+              <a:t>14</a:t>
             </a:fld>
             <a:endParaRPr lang="en-US">
               <a:solidFill>
@@ -7384,7 +8800,7 @@
 </p:sld>
 </file>
 
-<file path=ppt/slides/slide11.xml><?xml version="1.0" encoding="utf-8"?>
+<file path=ppt/slides/slide15.xml><?xml version="1.0" encoding="utf-8"?>
 <p:sld xmlns:a="http://schemas.openxmlformats.org/drawingml/2006/main" xmlns:r="http://schemas.openxmlformats.org/officeDocument/2006/relationships" xmlns:p="http://schemas.openxmlformats.org/presentationml/2006/main">
   <p:cSld>
     <p:bg>
@@ -7683,6 +9099,45 @@
               </a:rPr>
               <a:t>server-side composition</a:t>
             </a:r>
+          </a:p>
+        </p:txBody>
+      </p:sp>
+      <p:sp>
+        <p:nvSpPr>
+          <p:cNvPr id="2" name="Tekstvak 1">
+            <a:extLst>
+              <a:ext uri="{FF2B5EF4-FFF2-40B4-BE49-F238E27FC236}">
+                <a16:creationId xmlns:a16="http://schemas.microsoft.com/office/drawing/2014/main" id="{E243E7A7-35CC-F1A4-E8A7-1F891E4170FC}"/>
+              </a:ext>
+            </a:extLst>
+          </p:cNvPr>
+          <p:cNvSpPr txBox="1"/>
+          <p:nvPr/>
+        </p:nvSpPr>
+        <p:spPr>
+          <a:xfrm>
+            <a:off x="1663430" y="5058383"/>
+            <a:ext cx="8832715" cy="369332"/>
+          </a:xfrm>
+          <a:prstGeom prst="rect">
+            <a:avLst/>
+          </a:prstGeom>
+          <a:noFill/>
+        </p:spPr>
+        <p:txBody>
+          <a:bodyPr wrap="square" rtlCol="0">
+            <a:spAutoFit/>
+          </a:bodyPr>
+          <a:lstStyle/>
+          <a:p>
+            <a:pPr algn="ctr"/>
+            <a:r>
+              <a:rPr lang="en-US" dirty="0">
+                <a:hlinkClick r:id="rId3"/>
+              </a:rPr>
+              <a:t>https://github.com/zalando/tailor</a:t>
+            </a:r>
+            <a:endParaRPr lang="nl-NL" dirty="0"/>
           </a:p>
         </p:txBody>
       </p:sp>
@@ -7791,7 +9246,7 @@
 </p:sld>
 </file>
 
-<file path=ppt/slides/slide12.xml><?xml version="1.0" encoding="utf-8"?>
+<file path=ppt/slides/slide16.xml><?xml version="1.0" encoding="utf-8"?>
 <p:sld xmlns:a="http://schemas.openxmlformats.org/drawingml/2006/main" xmlns:r="http://schemas.openxmlformats.org/officeDocument/2006/relationships" xmlns:p="http://schemas.openxmlformats.org/presentationml/2006/main">
   <p:cSld>
     <p:bg>
@@ -8137,7 +9592,7 @@
                   <a:spcPts val="600"/>
                 </a:spcAft>
               </a:pPr>
-              <a:t>12</a:t>
+              <a:t>16</a:t>
             </a:fld>
             <a:endParaRPr lang="en-US">
               <a:solidFill>
@@ -8252,7 +9707,7 @@
 </p:sld>
 </file>
 
-<file path=ppt/slides/slide13.xml><?xml version="1.0" encoding="utf-8"?>
+<file path=ppt/slides/slide17.xml><?xml version="1.0" encoding="utf-8"?>
 <p:sld xmlns:a="http://schemas.openxmlformats.org/drawingml/2006/main" xmlns:r="http://schemas.openxmlformats.org/officeDocument/2006/relationships" xmlns:p="http://schemas.openxmlformats.org/presentationml/2006/main">
   <p:cSld>
     <p:spTree>
@@ -8480,7 +9935,7 @@
                   <a:spcPts val="600"/>
                 </a:spcAft>
               </a:pPr>
-              <a:t>13</a:t>
+              <a:t>17</a:t>
             </a:fld>
             <a:endParaRPr lang="en-US"/>
           </a:p>
@@ -8499,7 +9954,7 @@
 </p:sld>
 </file>
 
-<file path=ppt/slides/slide14.xml><?xml version="1.0" encoding="utf-8"?>
+<file path=ppt/slides/slide18.xml><?xml version="1.0" encoding="utf-8"?>
 <p:sld xmlns:a="http://schemas.openxmlformats.org/drawingml/2006/main" xmlns:r="http://schemas.openxmlformats.org/officeDocument/2006/relationships" xmlns:p="http://schemas.openxmlformats.org/presentationml/2006/main">
   <p:cSld>
     <p:spTree>
@@ -9355,12 +10810,28 @@
               <a:buAutoNum type="arabicPeriod"/>
             </a:pPr>
             <a:r>
-              <a:rPr lang="en-US">
+              <a:rPr lang="en-US" dirty="0">
                 <a:solidFill>
                   <a:schemeClr val="tx1"/>
                 </a:solidFill>
               </a:rPr>
-              <a:t>Wat zijn MFE’s? 🤔</a:t>
+              <a:t>Wat </a:t>
+            </a:r>
+            <a:r>
+              <a:rPr lang="en-US" dirty="0" err="1">
+                <a:solidFill>
+                  <a:schemeClr val="tx1"/>
+                </a:solidFill>
+              </a:rPr>
+              <a:t>zijn</a:t>
+            </a:r>
+            <a:r>
+              <a:rPr lang="en-US" dirty="0">
+                <a:solidFill>
+                  <a:schemeClr val="tx1"/>
+                </a:solidFill>
+              </a:rPr>
+              <a:t> MFE’s? 🤔</a:t>
             </a:r>
           </a:p>
           <a:p>
@@ -9369,12 +10840,52 @@
               <a:buAutoNum type="arabicPeriod"/>
             </a:pPr>
             <a:r>
-              <a:rPr lang="en-US">
+              <a:rPr lang="en-US" dirty="0" err="1">
                 <a:solidFill>
                   <a:schemeClr val="tx1"/>
                 </a:solidFill>
               </a:rPr>
-              <a:t>Voor- en nadelen ⚖ </a:t>
+              <a:t>Waarom</a:t>
+            </a:r>
+            <a:r>
+              <a:rPr lang="en-US" dirty="0">
+                <a:solidFill>
+                  <a:schemeClr val="tx1"/>
+                </a:solidFill>
+              </a:rPr>
+              <a:t> (</a:t>
+            </a:r>
+            <a:r>
+              <a:rPr lang="en-US" dirty="0" err="1">
+                <a:solidFill>
+                  <a:schemeClr val="tx1"/>
+                </a:solidFill>
+              </a:rPr>
+              <a:t>niet</a:t>
+            </a:r>
+            <a:r>
+              <a:rPr lang="en-US" dirty="0">
+                <a:solidFill>
+                  <a:schemeClr val="tx1"/>
+                </a:solidFill>
+              </a:rPr>
+              <a:t>)? </a:t>
+            </a:r>
+            <a:r>
+              <a:rPr lang="nl-NL" dirty="0">
+                <a:solidFill>
+                  <a:schemeClr val="tx1"/>
+                </a:solidFill>
+              </a:rPr>
+              <a:t>☯</a:t>
+            </a:r>
+            <a:r>
+              <a:rPr lang="en-US" dirty="0">
+                <a:solidFill>
+                  <a:schemeClr val="tx1"/>
+                </a:solidFill>
+              </a:rPr>
+              <a:t> </a:t>
             </a:r>
           </a:p>
           <a:p>
@@ -9383,7 +10894,7 @@
               <a:buAutoNum type="arabicPeriod"/>
             </a:pPr>
             <a:r>
-              <a:rPr lang="en-US">
+              <a:rPr lang="en-US" dirty="0">
                 <a:solidFill>
                   <a:schemeClr val="tx1"/>
                 </a:solidFill>
@@ -9397,16 +10908,24 @@
               <a:buAutoNum type="arabicPeriod"/>
             </a:pPr>
             <a:r>
-              <a:rPr lang="en-US">
+              <a:rPr lang="en-US" dirty="0" err="1">
                 <a:solidFill>
                   <a:schemeClr val="tx1"/>
                 </a:solidFill>
               </a:rPr>
-              <a:t>Implementatie 👨‍💻</a:t>
-            </a:r>
-          </a:p>
-          <a:p>
-            <a:endParaRPr lang="en-US">
+              <a:t>Implementatie</a:t>
+            </a:r>
+            <a:r>
+              <a:rPr lang="en-US" dirty="0">
+                <a:solidFill>
+                  <a:schemeClr val="tx1"/>
+                </a:solidFill>
+              </a:rPr>
+              <a:t> 👨‍💻</a:t>
+            </a:r>
+          </a:p>
+          <a:p>
+            <a:endParaRPr lang="en-US" dirty="0">
               <a:solidFill>
                 <a:schemeClr val="tx1"/>
               </a:solidFill>
@@ -9986,7 +11505,13 @@
     </p:bg>
     <p:spTree>
       <p:nvGrpSpPr>
-        <p:cNvPr id="1" name=""/>
+        <p:cNvPr id="1" name="">
+          <a:extLst>
+            <a:ext uri="{FF2B5EF4-FFF2-40B4-BE49-F238E27FC236}">
+              <a16:creationId xmlns:a16="http://schemas.microsoft.com/office/drawing/2014/main" id="{215D9244-9965-4BA7-1DF5-67967C21C9F3}"/>
+            </a:ext>
+          </a:extLst>
+        </p:cNvPr>
         <p:cNvGrpSpPr/>
         <p:nvPr/>
       </p:nvGrpSpPr>
@@ -9998,12 +11523,12 @@
           <a:chExt cx="0" cy="0"/>
         </a:xfrm>
       </p:grpSpPr>
-      <p:sp>
-        <p:nvSpPr>
-          <p:cNvPr id="10" name="Rectangle 9">
-            <a:extLst>
-              <a:ext uri="{FF2B5EF4-FFF2-40B4-BE49-F238E27FC236}">
-                <a16:creationId xmlns:a16="http://schemas.microsoft.com/office/drawing/2014/main" id="{09A1C012-8297-4361-ACE8-A2509FB18911}"/>
+      <p:sp useBgFill="1">
+        <p:nvSpPr>
+          <p:cNvPr id="1040" name="Rectangle 1039">
+            <a:extLst>
+              <a:ext uri="{FF2B5EF4-FFF2-40B4-BE49-F238E27FC236}">
+                <a16:creationId xmlns:a16="http://schemas.microsoft.com/office/drawing/2014/main" id="{6BC377B7-18F1-42AD-A1DD-E1D6A5B27CE9}"/>
               </a:ext>
               <a:ext uri="{C183D7F6-B498-43B3-948B-1728B52AA6E4}">
                 <adec:decorative xmlns:adec="http://schemas.microsoft.com/office/drawing/2017/decorative" val="1"/>
@@ -10023,15 +11548,12 @@
         </p:nvSpPr>
         <p:spPr>
           <a:xfrm>
-            <a:off x="0" y="4206240"/>
-            <a:ext cx="12192000" cy="2651760"/>
+            <a:off x="0" y="0"/>
+            <a:ext cx="12192000" cy="6858000"/>
           </a:xfrm>
           <a:prstGeom prst="rect">
             <a:avLst/>
           </a:prstGeom>
-          <a:solidFill>
-            <a:schemeClr val="tx1"/>
-          </a:solidFill>
           <a:ln>
             <a:noFill/>
           </a:ln>
@@ -10061,12 +11583,12 @@
           </a:p>
         </p:txBody>
       </p:sp>
-      <p:sp useBgFill="1">
-        <p:nvSpPr>
-          <p:cNvPr id="12" name="Rectangle 11">
-            <a:extLst>
-              <a:ext uri="{FF2B5EF4-FFF2-40B4-BE49-F238E27FC236}">
-                <a16:creationId xmlns:a16="http://schemas.microsoft.com/office/drawing/2014/main" id="{4AA13AD3-0A4F-475A-BEBB-DEEFF5C096C3}"/>
+      <p:sp>
+        <p:nvSpPr>
+          <p:cNvPr id="1042" name="Freeform: Shape 1041">
+            <a:extLst>
+              <a:ext uri="{FF2B5EF4-FFF2-40B4-BE49-F238E27FC236}">
+                <a16:creationId xmlns:a16="http://schemas.microsoft.com/office/drawing/2014/main" id="{E27CBDD7-6A01-4B3F-B16A-F50305427BC5}"/>
               </a:ext>
               <a:ext uri="{C183D7F6-B498-43B3-948B-1728B52AA6E4}">
                 <adec:decorative xmlns:adec="http://schemas.microsoft.com/office/drawing/2017/decorative" val="1"/>
@@ -10089,9 +11611,88 @@
             <a:off x="0" y="0"/>
             <a:ext cx="12192000" cy="6858000"/>
           </a:xfrm>
-          <a:prstGeom prst="rect">
+          <a:custGeom>
             <a:avLst/>
-          </a:prstGeom>
+            <a:gdLst>
+              <a:gd name="connsiteX0" fmla="*/ 643467 w 12192000"/>
+              <a:gd name="connsiteY0" fmla="*/ 640822 h 6858000"/>
+              <a:gd name="connsiteX1" fmla="*/ 643467 w 12192000"/>
+              <a:gd name="connsiteY1" fmla="*/ 6217178 h 6858000"/>
+              <a:gd name="connsiteX2" fmla="*/ 11548533 w 12192000"/>
+              <a:gd name="connsiteY2" fmla="*/ 6217178 h 6858000"/>
+              <a:gd name="connsiteX3" fmla="*/ 11548533 w 12192000"/>
+              <a:gd name="connsiteY3" fmla="*/ 640822 h 6858000"/>
+              <a:gd name="connsiteX4" fmla="*/ 0 w 12192000"/>
+              <a:gd name="connsiteY4" fmla="*/ 0 h 6858000"/>
+              <a:gd name="connsiteX5" fmla="*/ 12192000 w 12192000"/>
+              <a:gd name="connsiteY5" fmla="*/ 0 h 6858000"/>
+              <a:gd name="connsiteX6" fmla="*/ 12192000 w 12192000"/>
+              <a:gd name="connsiteY6" fmla="*/ 6858000 h 6858000"/>
+              <a:gd name="connsiteX7" fmla="*/ 0 w 12192000"/>
+              <a:gd name="connsiteY7" fmla="*/ 6858000 h 6858000"/>
+            </a:gdLst>
+            <a:ahLst/>
+            <a:cxnLst>
+              <a:cxn ang="0">
+                <a:pos x="connsiteX0" y="connsiteY0"/>
+              </a:cxn>
+              <a:cxn ang="0">
+                <a:pos x="connsiteX1" y="connsiteY1"/>
+              </a:cxn>
+              <a:cxn ang="0">
+                <a:pos x="connsiteX2" y="connsiteY2"/>
+              </a:cxn>
+              <a:cxn ang="0">
+                <a:pos x="connsiteX3" y="connsiteY3"/>
+              </a:cxn>
+              <a:cxn ang="0">
+                <a:pos x="connsiteX4" y="connsiteY4"/>
+              </a:cxn>
+              <a:cxn ang="0">
+                <a:pos x="connsiteX5" y="connsiteY5"/>
+              </a:cxn>
+              <a:cxn ang="0">
+                <a:pos x="connsiteX6" y="connsiteY6"/>
+              </a:cxn>
+              <a:cxn ang="0">
+                <a:pos x="connsiteX7" y="connsiteY7"/>
+              </a:cxn>
+            </a:cxnLst>
+            <a:rect l="l" t="t" r="r" b="b"/>
+            <a:pathLst>
+              <a:path w="12192000" h="6858000">
+                <a:moveTo>
+                  <a:pt x="643467" y="640822"/>
+                </a:moveTo>
+                <a:lnTo>
+                  <a:pt x="643467" y="6217178"/>
+                </a:lnTo>
+                <a:lnTo>
+                  <a:pt x="11548533" y="6217178"/>
+                </a:lnTo>
+                <a:lnTo>
+                  <a:pt x="11548533" y="640822"/>
+                </a:lnTo>
+                <a:close/>
+                <a:moveTo>
+                  <a:pt x="0" y="0"/>
+                </a:moveTo>
+                <a:lnTo>
+                  <a:pt x="12192000" y="0"/>
+                </a:lnTo>
+                <a:lnTo>
+                  <a:pt x="12192000" y="6858000"/>
+                </a:lnTo>
+                <a:lnTo>
+                  <a:pt x="0" y="6858000"/>
+                </a:lnTo>
+                <a:close/>
+              </a:path>
+            </a:pathLst>
+          </a:custGeom>
+          <a:solidFill>
+            <a:schemeClr val="tx1"/>
+          </a:solidFill>
           <a:ln>
             <a:noFill/>
           </a:ln>
@@ -10113,7 +11714,9 @@
           </a:fontRef>
         </p:style>
         <p:txBody>
-          <a:bodyPr rtlCol="0" anchor="ctr"/>
+          <a:bodyPr wrap="square" rtlCol="0" anchor="ctr">
+            <a:noAutofit/>
+          </a:bodyPr>
           <a:lstStyle/>
           <a:p>
             <a:pPr algn="ctr"/>
@@ -10121,309 +11724,45 @@
           </a:p>
         </p:txBody>
       </p:sp>
-      <p:sp>
-        <p:nvSpPr>
-          <p:cNvPr id="14" name="Rectangle 13">
-            <a:extLst>
-              <a:ext uri="{FF2B5EF4-FFF2-40B4-BE49-F238E27FC236}">
-                <a16:creationId xmlns:a16="http://schemas.microsoft.com/office/drawing/2014/main" id="{205BB74C-33FB-4335-8808-49E247F7BF75}"/>
-              </a:ext>
-              <a:ext uri="{C183D7F6-B498-43B3-948B-1728B52AA6E4}">
-                <adec:decorative xmlns:adec="http://schemas.microsoft.com/office/drawing/2017/decorative" val="1"/>
-              </a:ext>
-            </a:extLst>
-          </p:cNvPr>
-          <p:cNvSpPr>
-            <a:spLocks noGrp="1" noRot="1" noChangeAspect="1" noMove="1" noResize="1" noEditPoints="1" noAdjustHandles="1" noChangeArrowheads="1" noChangeShapeType="1" noTextEdit="1"/>
-          </p:cNvSpPr>
-          <p:nvPr>
-            <p:extLst>
-              <p:ext uri="{386F3935-93C4-4BCD-93E2-E3B085C9AB24}">
-                <p16:designElem xmlns:p16="http://schemas.microsoft.com/office/powerpoint/2015/main" val="1"/>
-              </p:ext>
-            </p:extLst>
-          </p:nvPr>
-        </p:nvSpPr>
-        <p:spPr>
-          <a:xfrm>
-            <a:off x="1" y="1225106"/>
-            <a:ext cx="12192000" cy="3788958"/>
+      <p:pic>
+        <p:nvPicPr>
+          <p:cNvPr id="3" name="Afbeelding 2">
+            <a:extLst>
+              <a:ext uri="{FF2B5EF4-FFF2-40B4-BE49-F238E27FC236}">
+                <a16:creationId xmlns:a16="http://schemas.microsoft.com/office/drawing/2014/main" id="{34FA2707-D3BF-93CE-E76A-B41DCAF46927}"/>
+              </a:ext>
+            </a:extLst>
+          </p:cNvPr>
+          <p:cNvPicPr>
+            <a:picLocks noChangeAspect="1"/>
+          </p:cNvPicPr>
+          <p:nvPr/>
+        </p:nvPicPr>
+        <p:blipFill>
+          <a:blip r:embed="rId2"/>
+          <a:stretch>
+            <a:fillRect/>
+          </a:stretch>
+        </p:blipFill>
+        <p:spPr>
+          <a:xfrm>
+            <a:off x="1149439" y="1240146"/>
+            <a:ext cx="9893122" cy="4377707"/>
           </a:xfrm>
           <a:prstGeom prst="rect">
             <a:avLst/>
           </a:prstGeom>
-          <a:solidFill>
-            <a:schemeClr val="tx1"/>
-          </a:solidFill>
-          <a:ln>
-            <a:noFill/>
-          </a:ln>
-        </p:spPr>
-        <p:style>
-          <a:lnRef idx="2">
-            <a:schemeClr val="accent1">
-              <a:shade val="50000"/>
-            </a:schemeClr>
-          </a:lnRef>
-          <a:fillRef idx="1">
-            <a:schemeClr val="accent1"/>
-          </a:fillRef>
-          <a:effectRef idx="0">
-            <a:schemeClr val="accent1"/>
-          </a:effectRef>
-          <a:fontRef idx="minor">
-            <a:schemeClr val="lt1"/>
-          </a:fontRef>
-        </p:style>
-        <p:txBody>
-          <a:bodyPr rtlCol="0" anchor="ctr"/>
-          <a:lstStyle/>
-          <a:p>
-            <a:pPr algn="ctr"/>
-            <a:endParaRPr lang="en-US"/>
-          </a:p>
-        </p:txBody>
-      </p:sp>
-      <p:sp>
-        <p:nvSpPr>
-          <p:cNvPr id="2" name="Titel 1">
-            <a:extLst>
-              <a:ext uri="{FF2B5EF4-FFF2-40B4-BE49-F238E27FC236}">
-                <a16:creationId xmlns:a16="http://schemas.microsoft.com/office/drawing/2014/main" id="{AE03639A-48FA-1D1E-D6B0-D1691B6EFDA5}"/>
-              </a:ext>
-            </a:extLst>
-          </p:cNvPr>
-          <p:cNvSpPr>
-            <a:spLocks noGrp="1"/>
-          </p:cNvSpPr>
-          <p:nvPr>
-            <p:ph type="title"/>
-          </p:nvPr>
-        </p:nvSpPr>
-        <p:spPr>
-          <a:xfrm>
-            <a:off x="960120" y="1841412"/>
-            <a:ext cx="10268712" cy="2688020"/>
-          </a:xfrm>
-        </p:spPr>
-        <p:txBody>
-          <a:bodyPr vert="horz" lIns="91440" tIns="45720" rIns="91440" bIns="45720" rtlCol="0" anchor="ctr">
-            <a:normAutofit fontScale="90000"/>
-          </a:bodyPr>
-          <a:lstStyle/>
-          <a:p>
-            <a:r>
-              <a:rPr lang="nl-NL" sz="2400" cap="none" dirty="0">
-                <a:solidFill>
-                  <a:srgbClr val="0D0D0D"/>
-                </a:solidFill>
-                <a:latin typeface="Söhne"/>
-              </a:rPr>
-              <a:t>- </a:t>
-            </a:r>
-            <a:r>
-              <a:rPr lang="nl-NL" sz="2400" b="0" i="0" cap="none" dirty="0" err="1">
-                <a:solidFill>
-                  <a:srgbClr val="0D0D0D"/>
-                </a:solidFill>
-                <a:effectLst/>
-                <a:latin typeface="Söhne"/>
-              </a:rPr>
-              <a:t>Frontend</a:t>
-            </a:r>
-            <a:r>
-              <a:rPr lang="nl-NL" sz="2400" b="0" i="0" cap="none" dirty="0">
-                <a:solidFill>
-                  <a:srgbClr val="0D0D0D"/>
-                </a:solidFill>
-                <a:effectLst/>
-                <a:latin typeface="Söhne"/>
-              </a:rPr>
-              <a:t> opgedeeld in kleine, onafhankelijke en herbruikbare componenten. </a:t>
-            </a:r>
-            <a:br>
-              <a:rPr lang="nl-NL" sz="2400" b="0" i="0" cap="none" dirty="0">
-                <a:solidFill>
-                  <a:srgbClr val="0D0D0D"/>
-                </a:solidFill>
-                <a:effectLst/>
-                <a:latin typeface="Söhne"/>
-              </a:rPr>
-            </a:br>
-            <a:br>
-              <a:rPr lang="nl-NL" sz="2400" b="0" i="0" cap="none" dirty="0">
-                <a:solidFill>
-                  <a:srgbClr val="0D0D0D"/>
-                </a:solidFill>
-                <a:effectLst/>
-                <a:latin typeface="Söhne"/>
-              </a:rPr>
-            </a:br>
-            <a:r>
-              <a:rPr lang="nl-NL" sz="2400" b="0" i="0" cap="none" dirty="0">
-                <a:solidFill>
-                  <a:srgbClr val="0D0D0D"/>
-                </a:solidFill>
-                <a:effectLst/>
-                <a:latin typeface="Söhne"/>
-              </a:rPr>
-              <a:t>- Deze componenten, oftewel </a:t>
-            </a:r>
-            <a:r>
-              <a:rPr lang="nl-NL" sz="2400" b="0" i="0" cap="none" dirty="0" err="1">
-                <a:solidFill>
-                  <a:srgbClr val="0D0D0D"/>
-                </a:solidFill>
-                <a:effectLst/>
-                <a:latin typeface="Söhne"/>
-              </a:rPr>
-              <a:t>microfrontends</a:t>
-            </a:r>
-            <a:r>
-              <a:rPr lang="nl-NL" sz="2400" b="0" i="0" cap="none" dirty="0">
-                <a:solidFill>
-                  <a:srgbClr val="0D0D0D"/>
-                </a:solidFill>
-                <a:effectLst/>
-                <a:latin typeface="Söhne"/>
-              </a:rPr>
-              <a:t>, kunnen afzonderlijk worden ontwikkeld, getest, </a:t>
-            </a:r>
-            <a:r>
-              <a:rPr lang="nl-NL" sz="2400" b="0" i="0" cap="none" dirty="0" err="1">
-                <a:solidFill>
-                  <a:srgbClr val="0D0D0D"/>
-                </a:solidFill>
-                <a:effectLst/>
-                <a:latin typeface="Söhne"/>
-              </a:rPr>
-              <a:t>gedeployed</a:t>
-            </a:r>
-            <a:r>
-              <a:rPr lang="nl-NL" sz="2400" b="0" i="0" cap="none" dirty="0">
-                <a:solidFill>
-                  <a:srgbClr val="0D0D0D"/>
-                </a:solidFill>
-                <a:effectLst/>
-                <a:latin typeface="Söhne"/>
-              </a:rPr>
-              <a:t> en onderhouden. </a:t>
-            </a:r>
-            <a:br>
-              <a:rPr lang="nl-NL" sz="2400" b="0" i="0" cap="none" dirty="0">
-                <a:solidFill>
-                  <a:srgbClr val="0D0D0D"/>
-                </a:solidFill>
-                <a:effectLst/>
-                <a:latin typeface="Söhne"/>
-              </a:rPr>
-            </a:br>
-            <a:br>
-              <a:rPr lang="nl-NL" sz="2400" b="0" i="0" cap="none" dirty="0">
-                <a:solidFill>
-                  <a:srgbClr val="0D0D0D"/>
-                </a:solidFill>
-                <a:effectLst/>
-                <a:latin typeface="Söhne"/>
-              </a:rPr>
-            </a:br>
-            <a:r>
-              <a:rPr lang="nl-NL" sz="2400" b="0" i="0" cap="none" dirty="0">
-                <a:solidFill>
-                  <a:srgbClr val="0D0D0D"/>
-                </a:solidFill>
-                <a:effectLst/>
-                <a:latin typeface="Söhne"/>
-              </a:rPr>
-              <a:t>- Elke </a:t>
-            </a:r>
-            <a:r>
-              <a:rPr lang="nl-NL" sz="2400" b="0" i="0" cap="none" dirty="0" err="1">
-                <a:solidFill>
-                  <a:srgbClr val="0D0D0D"/>
-                </a:solidFill>
-                <a:effectLst/>
-                <a:latin typeface="Söhne"/>
-              </a:rPr>
-              <a:t>microfrontend</a:t>
-            </a:r>
-            <a:r>
-              <a:rPr lang="nl-NL" sz="2400" b="0" i="0" cap="none" dirty="0">
-                <a:solidFill>
-                  <a:srgbClr val="0D0D0D"/>
-                </a:solidFill>
-                <a:effectLst/>
-                <a:latin typeface="Söhne"/>
-              </a:rPr>
-              <a:t> is verantwoordelijk voor een specifiek deel van de gebruikersinterface of functionaliteit van de applicatie.</a:t>
-            </a:r>
-            <a:endParaRPr lang="en-US" sz="6600" cap="none" dirty="0"/>
-          </a:p>
-        </p:txBody>
-      </p:sp>
-      <p:sp>
-        <p:nvSpPr>
-          <p:cNvPr id="5" name="Tijdelijke aanduiding voor dianummer 4">
-            <a:extLst>
-              <a:ext uri="{FF2B5EF4-FFF2-40B4-BE49-F238E27FC236}">
-                <a16:creationId xmlns:a16="http://schemas.microsoft.com/office/drawing/2014/main" id="{1F4B8705-43D2-81D7-892A-CF752BAFC7AE}"/>
-              </a:ext>
-            </a:extLst>
-          </p:cNvPr>
-          <p:cNvSpPr>
-            <a:spLocks noGrp="1"/>
-          </p:cNvSpPr>
-          <p:nvPr>
-            <p:ph type="sldNum" sz="quarter" idx="12"/>
-          </p:nvPr>
-        </p:nvSpPr>
-        <p:spPr>
-          <a:xfrm>
-            <a:off x="10296144" y="6356350"/>
-            <a:ext cx="932688" cy="365125"/>
-          </a:xfrm>
-        </p:spPr>
-        <p:txBody>
-          <a:bodyPr vert="horz" lIns="91440" tIns="45720" rIns="91440" bIns="45720" rtlCol="0" anchor="ctr">
-            <a:normAutofit/>
-          </a:bodyPr>
-          <a:lstStyle/>
-          <a:p>
-            <a:pPr algn="l">
-              <a:spcAft>
-                <a:spcPts val="600"/>
-              </a:spcAft>
-            </a:pPr>
-            <a:fld id="{294A09A9-5501-47C1-A89A-A340965A2BE2}" type="slidenum">
-              <a:rPr lang="en-US">
-                <a:solidFill>
-                  <a:schemeClr val="tx1"/>
-                </a:solidFill>
-              </a:rPr>
-              <a:pPr algn="l">
-                <a:spcAft>
-                  <a:spcPts val="600"/>
-                </a:spcAft>
-              </a:pPr>
-              <a:t>5</a:t>
-            </a:fld>
-            <a:endParaRPr lang="en-US">
-              <a:solidFill>
-                <a:schemeClr val="tx1"/>
-              </a:solidFill>
-            </a:endParaRPr>
-          </a:p>
-        </p:txBody>
-      </p:sp>
+        </p:spPr>
+      </p:pic>
     </p:spTree>
     <p:extLst>
       <p:ext uri="{BB962C8B-B14F-4D97-AF65-F5344CB8AC3E}">
-        <p14:creationId xmlns:p14="http://schemas.microsoft.com/office/powerpoint/2010/main" val="1968755801"/>
+        <p14:creationId xmlns:p14="http://schemas.microsoft.com/office/powerpoint/2010/main" val="2939200485"/>
       </p:ext>
     </p:extLst>
   </p:cSld>
   <p:clrMapOvr>
-    <a:overrideClrMapping bg1="dk1" tx1="lt1" bg2="dk2" tx2="lt2" accent1="accent1" accent2="accent2" accent3="accent3" accent4="accent4" accent5="accent5" accent6="accent6" hlink="hlink" folHlink="folHlink"/>
+    <a:masterClrMapping/>
   </p:clrMapOvr>
 </p:sld>
 </file>
@@ -10455,7 +11794,7 @@
       </p:grpSpPr>
       <p:sp>
         <p:nvSpPr>
-          <p:cNvPr id="29" name="Rectangle 28">
+          <p:cNvPr id="19" name="Rectangle 18">
             <a:extLst>
               <a:ext uri="{FF2B5EF4-FFF2-40B4-BE49-F238E27FC236}">
                 <a16:creationId xmlns:a16="http://schemas.microsoft.com/office/drawing/2014/main" id="{09A1C012-8297-4361-ACE8-A2509FB18911}"/>
@@ -10518,7 +11857,7 @@
       </p:sp>
       <p:sp useBgFill="1">
         <p:nvSpPr>
-          <p:cNvPr id="31" name="Rectangle 30">
+          <p:cNvPr id="21" name="Rectangle 20">
             <a:extLst>
               <a:ext uri="{FF2B5EF4-FFF2-40B4-BE49-F238E27FC236}">
                 <a16:creationId xmlns:a16="http://schemas.microsoft.com/office/drawing/2014/main" id="{4AA13AD3-0A4F-475A-BEBB-DEEFF5C096C3}"/>
@@ -10541,8 +11880,8 @@
         </p:nvSpPr>
         <p:spPr>
           <a:xfrm>
-            <a:off x="10510" y="0"/>
-            <a:ext cx="12188952" cy="6858000"/>
+            <a:off x="0" y="0"/>
+            <a:ext cx="12192000" cy="6858000"/>
           </a:xfrm>
           <a:prstGeom prst="rect">
             <a:avLst/>
@@ -10578,10 +11917,10 @@
       </p:sp>
       <p:sp>
         <p:nvSpPr>
-          <p:cNvPr id="33" name="Rectangle 32">
-            <a:extLst>
-              <a:ext uri="{FF2B5EF4-FFF2-40B4-BE49-F238E27FC236}">
-                <a16:creationId xmlns:a16="http://schemas.microsoft.com/office/drawing/2014/main" id="{D65E0E3C-32F3-480B-9842-7611BBE2EE9F}"/>
+          <p:cNvPr id="23" name="Rectangle 22">
+            <a:extLst>
+              <a:ext uri="{FF2B5EF4-FFF2-40B4-BE49-F238E27FC236}">
+                <a16:creationId xmlns:a16="http://schemas.microsoft.com/office/drawing/2014/main" id="{205BB74C-33FB-4335-8808-49E247F7BF75}"/>
               </a:ext>
               <a:ext uri="{C183D7F6-B498-43B3-948B-1728B52AA6E4}">
                 <adec:decorative xmlns:adec="http://schemas.microsoft.com/office/drawing/2017/decorative" val="1"/>
@@ -10601,8 +11940,8 @@
         </p:nvSpPr>
         <p:spPr>
           <a:xfrm>
-            <a:off x="0" y="0"/>
-            <a:ext cx="7534655" cy="6858000"/>
+            <a:off x="1" y="1225106"/>
+            <a:ext cx="12192000" cy="3788958"/>
           </a:xfrm>
           <a:prstGeom prst="rect">
             <a:avLst/>
@@ -10641,10 +11980,10 @@
       </p:sp>
       <p:sp>
         <p:nvSpPr>
-          <p:cNvPr id="23" name="Title 22">
-            <a:extLst>
-              <a:ext uri="{FF2B5EF4-FFF2-40B4-BE49-F238E27FC236}">
-                <a16:creationId xmlns:a16="http://schemas.microsoft.com/office/drawing/2014/main" id="{CC69C1A1-78E3-4597-AE36-69056DA332BE}"/>
+          <p:cNvPr id="2" name="Titel 1">
+            <a:extLst>
+              <a:ext uri="{FF2B5EF4-FFF2-40B4-BE49-F238E27FC236}">
+                <a16:creationId xmlns:a16="http://schemas.microsoft.com/office/drawing/2014/main" id="{AE03639A-48FA-1D1E-D6B0-D1691B6EFDA5}"/>
               </a:ext>
             </a:extLst>
           </p:cNvPr>
@@ -10657,8 +11996,8 @@
         </p:nvSpPr>
         <p:spPr>
           <a:xfrm>
-            <a:off x="640079" y="640080"/>
-            <a:ext cx="6389027" cy="5569164"/>
+            <a:off x="960120" y="1841412"/>
+            <a:ext cx="10268712" cy="2688020"/>
           </a:xfrm>
         </p:spPr>
         <p:txBody>
@@ -10667,59 +12006,382 @@
           </a:bodyPr>
           <a:lstStyle/>
           <a:p>
-            <a:pPr algn="r"/>
-            <a:r>
-              <a:rPr lang="en-US" sz="8800"/>
-              <a:t>Voor- en nadelen ⚖</a:t>
-            </a:r>
-          </a:p>
-        </p:txBody>
-      </p:sp>
-      <p:sp>
-        <p:nvSpPr>
-          <p:cNvPr id="24" name="Content Placeholder 23">
-            <a:extLst>
-              <a:ext uri="{FF2B5EF4-FFF2-40B4-BE49-F238E27FC236}">
-                <a16:creationId xmlns:a16="http://schemas.microsoft.com/office/drawing/2014/main" id="{D593D767-CBED-4343-BF82-E91FA5BF5521}"/>
-              </a:ext>
-            </a:extLst>
-          </p:cNvPr>
-          <p:cNvSpPr>
-            <a:spLocks noGrp="1"/>
-          </p:cNvSpPr>
-          <p:nvPr>
-            <p:ph idx="1"/>
-          </p:nvPr>
-        </p:nvSpPr>
-        <p:spPr>
-          <a:xfrm>
-            <a:off x="8029797" y="640079"/>
-            <a:ext cx="3199034" cy="5569165"/>
-          </a:xfrm>
-        </p:spPr>
-        <p:txBody>
-          <a:bodyPr vert="horz" lIns="91440" tIns="45720" rIns="91440" bIns="45720" rtlCol="0" anchor="ctr">
-            <a:normAutofit/>
-          </a:bodyPr>
-          <a:lstStyle/>
-          <a:p>
-            <a:r>
-              <a:rPr lang="en-US" sz="3600">
-                <a:solidFill>
-                  <a:schemeClr val="tx1"/>
-                </a:solidFill>
-              </a:rPr>
-              <a:t>De waarde van micro-frontends</a:t>
-            </a:r>
-          </a:p>
-        </p:txBody>
-      </p:sp>
-      <p:sp>
-        <p:nvSpPr>
-          <p:cNvPr id="7" name="Slide Number Placeholder 6">
-            <a:extLst>
-              <a:ext uri="{FF2B5EF4-FFF2-40B4-BE49-F238E27FC236}">
-                <a16:creationId xmlns:a16="http://schemas.microsoft.com/office/drawing/2014/main" id="{A352ABE0-11DD-496F-AD25-CB335771B694}"/>
+            <a:r>
+              <a:rPr lang="en-US" sz="2200" dirty="0"/>
+              <a:t>- </a:t>
+            </a:r>
+            <a:r>
+              <a:rPr lang="en-US" sz="2200" b="0" i="0" dirty="0">
+                <a:effectLst/>
+              </a:rPr>
+              <a:t>Frontend </a:t>
+            </a:r>
+            <a:r>
+              <a:rPr lang="en-US" sz="2200" b="0" i="0" dirty="0" err="1">
+                <a:effectLst/>
+              </a:rPr>
+              <a:t>opgedeeld</a:t>
+            </a:r>
+            <a:r>
+              <a:rPr lang="en-US" sz="2200" b="0" i="0" dirty="0">
+                <a:effectLst/>
+              </a:rPr>
+              <a:t> in </a:t>
+            </a:r>
+            <a:r>
+              <a:rPr lang="en-US" sz="2200" b="0" i="0" dirty="0" err="1">
+                <a:effectLst/>
+              </a:rPr>
+              <a:t>kleine</a:t>
+            </a:r>
+            <a:r>
+              <a:rPr lang="en-US" sz="2200" b="0" i="0" dirty="0">
+                <a:effectLst/>
+              </a:rPr>
+              <a:t>, </a:t>
+            </a:r>
+            <a:r>
+              <a:rPr lang="en-US" sz="2200" b="0" i="0" dirty="0" err="1">
+                <a:effectLst/>
+              </a:rPr>
+              <a:t>onafhankelijke</a:t>
+            </a:r>
+            <a:r>
+              <a:rPr lang="en-US" sz="2200" b="0" i="0" dirty="0">
+                <a:effectLst/>
+              </a:rPr>
+              <a:t> </a:t>
+            </a:r>
+            <a:r>
+              <a:rPr lang="en-US" sz="2200" b="0" i="0" dirty="0" err="1">
+                <a:effectLst/>
+              </a:rPr>
+              <a:t>en</a:t>
+            </a:r>
+            <a:r>
+              <a:rPr lang="en-US" sz="2200" b="0" i="0" dirty="0">
+                <a:effectLst/>
+              </a:rPr>
+              <a:t> </a:t>
+            </a:r>
+            <a:r>
+              <a:rPr lang="en-US" sz="2200" b="0" i="0" dirty="0" err="1">
+                <a:effectLst/>
+              </a:rPr>
+              <a:t>herbruikbare</a:t>
+            </a:r>
+            <a:r>
+              <a:rPr lang="en-US" sz="2200" b="0" i="0" dirty="0">
+                <a:effectLst/>
+              </a:rPr>
+              <a:t> </a:t>
+            </a:r>
+            <a:r>
+              <a:rPr lang="en-US" sz="2200" b="0" i="0" dirty="0" err="1">
+                <a:effectLst/>
+              </a:rPr>
+              <a:t>componenten</a:t>
+            </a:r>
+            <a:r>
+              <a:rPr lang="en-US" sz="2200" b="0" i="0" dirty="0">
+                <a:effectLst/>
+              </a:rPr>
+              <a:t>. </a:t>
+            </a:r>
+            <a:br>
+              <a:rPr lang="en-US" sz="2200" b="0" i="0" dirty="0">
+                <a:effectLst/>
+              </a:rPr>
+            </a:br>
+            <a:br>
+              <a:rPr lang="en-US" sz="2200" b="0" i="0" dirty="0">
+                <a:effectLst/>
+              </a:rPr>
+            </a:br>
+            <a:r>
+              <a:rPr lang="en-US" sz="2200" b="0" i="0" dirty="0">
+                <a:effectLst/>
+              </a:rPr>
+              <a:t>- </a:t>
+            </a:r>
+            <a:r>
+              <a:rPr lang="en-US" sz="2200" b="0" i="0" dirty="0" err="1">
+                <a:effectLst/>
+              </a:rPr>
+              <a:t>Deze</a:t>
+            </a:r>
+            <a:r>
+              <a:rPr lang="en-US" sz="2200" b="0" i="0" dirty="0">
+                <a:effectLst/>
+              </a:rPr>
+              <a:t> </a:t>
+            </a:r>
+            <a:r>
+              <a:rPr lang="en-US" sz="2200" b="0" i="0" dirty="0" err="1">
+                <a:effectLst/>
+              </a:rPr>
+              <a:t>componenten</a:t>
+            </a:r>
+            <a:r>
+              <a:rPr lang="en-US" sz="2200" b="0" i="0" dirty="0">
+                <a:effectLst/>
+              </a:rPr>
+              <a:t>, </a:t>
+            </a:r>
+            <a:r>
+              <a:rPr lang="en-US" sz="2200" b="0" i="0" dirty="0" err="1">
+                <a:effectLst/>
+              </a:rPr>
+              <a:t>oftewel</a:t>
+            </a:r>
+            <a:r>
+              <a:rPr lang="en-US" sz="2200" b="0" i="0" dirty="0">
+                <a:effectLst/>
+              </a:rPr>
+              <a:t> </a:t>
+            </a:r>
+            <a:r>
+              <a:rPr lang="en-US" sz="2200" b="0" i="0" dirty="0" err="1">
+                <a:effectLst/>
+              </a:rPr>
+              <a:t>microfrontends</a:t>
+            </a:r>
+            <a:r>
+              <a:rPr lang="en-US" sz="2200" b="0" i="0" dirty="0">
+                <a:effectLst/>
+              </a:rPr>
+              <a:t>, </a:t>
+            </a:r>
+            <a:r>
+              <a:rPr lang="en-US" sz="2200" b="0" i="0" dirty="0" err="1">
+                <a:effectLst/>
+              </a:rPr>
+              <a:t>kunnen</a:t>
+            </a:r>
+            <a:r>
+              <a:rPr lang="en-US" sz="2200" b="0" i="0" dirty="0">
+                <a:effectLst/>
+              </a:rPr>
+              <a:t> </a:t>
+            </a:r>
+            <a:r>
+              <a:rPr lang="en-US" sz="2200" b="0" i="0" dirty="0" err="1">
+                <a:effectLst/>
+              </a:rPr>
+              <a:t>afzonderlijk</a:t>
+            </a:r>
+            <a:r>
+              <a:rPr lang="en-US" sz="2200" b="0" i="0" dirty="0">
+                <a:effectLst/>
+              </a:rPr>
+              <a:t> </a:t>
+            </a:r>
+            <a:r>
+              <a:rPr lang="en-US" sz="2200" b="0" i="0" dirty="0" err="1">
+                <a:effectLst/>
+              </a:rPr>
+              <a:t>worden</a:t>
+            </a:r>
+            <a:r>
+              <a:rPr lang="en-US" sz="2200" b="0" i="0" dirty="0">
+                <a:effectLst/>
+              </a:rPr>
+              <a:t> </a:t>
+            </a:r>
+            <a:r>
+              <a:rPr lang="en-US" sz="2200" b="0" i="0" dirty="0" err="1">
+                <a:effectLst/>
+              </a:rPr>
+              <a:t>ontwikkeld</a:t>
+            </a:r>
+            <a:r>
+              <a:rPr lang="en-US" sz="2200" b="0" i="0" dirty="0">
+                <a:effectLst/>
+              </a:rPr>
+              <a:t>, </a:t>
+            </a:r>
+            <a:r>
+              <a:rPr lang="en-US" sz="2200" b="0" i="0" dirty="0" err="1">
+                <a:effectLst/>
+              </a:rPr>
+              <a:t>getest</a:t>
+            </a:r>
+            <a:r>
+              <a:rPr lang="en-US" sz="2200" b="0" i="0" dirty="0">
+                <a:effectLst/>
+              </a:rPr>
+              <a:t>, </a:t>
+            </a:r>
+            <a:r>
+              <a:rPr lang="en-US" sz="2200" b="0" i="0" dirty="0" err="1">
+                <a:effectLst/>
+              </a:rPr>
+              <a:t>gedeployed</a:t>
+            </a:r>
+            <a:r>
+              <a:rPr lang="en-US" sz="2200" b="0" i="0" dirty="0">
+                <a:effectLst/>
+              </a:rPr>
+              <a:t> </a:t>
+            </a:r>
+            <a:r>
+              <a:rPr lang="en-US" sz="2200" b="0" i="0" dirty="0" err="1">
+                <a:effectLst/>
+              </a:rPr>
+              <a:t>en</a:t>
+            </a:r>
+            <a:r>
+              <a:rPr lang="en-US" sz="2200" b="0" i="0" dirty="0">
+                <a:effectLst/>
+              </a:rPr>
+              <a:t> </a:t>
+            </a:r>
+            <a:r>
+              <a:rPr lang="en-US" sz="2200" b="0" i="0" dirty="0" err="1">
+                <a:effectLst/>
+              </a:rPr>
+              <a:t>onderhouden</a:t>
+            </a:r>
+            <a:r>
+              <a:rPr lang="en-US" sz="2200" b="0" i="0" dirty="0">
+                <a:effectLst/>
+              </a:rPr>
+              <a:t>. </a:t>
+            </a:r>
+            <a:br>
+              <a:rPr lang="en-US" sz="2200" b="0" i="0" dirty="0">
+                <a:effectLst/>
+              </a:rPr>
+            </a:br>
+            <a:br>
+              <a:rPr lang="en-US" sz="2200" b="0" i="0" dirty="0">
+                <a:effectLst/>
+              </a:rPr>
+            </a:br>
+            <a:r>
+              <a:rPr lang="en-US" sz="2200" b="0" i="0" dirty="0">
+                <a:effectLst/>
+              </a:rPr>
+              <a:t>- Elke </a:t>
+            </a:r>
+            <a:r>
+              <a:rPr lang="en-US" sz="2200" b="0" i="0" dirty="0" err="1">
+                <a:effectLst/>
+              </a:rPr>
+              <a:t>microfrontend</a:t>
+            </a:r>
+            <a:r>
+              <a:rPr lang="en-US" sz="2200" b="0" i="0" dirty="0">
+                <a:effectLst/>
+              </a:rPr>
+              <a:t> is </a:t>
+            </a:r>
+            <a:r>
+              <a:rPr lang="en-US" sz="2200" b="0" i="0" dirty="0" err="1">
+                <a:effectLst/>
+              </a:rPr>
+              <a:t>verantwoordelijk</a:t>
+            </a:r>
+            <a:r>
+              <a:rPr lang="en-US" sz="2200" b="0" i="0" dirty="0">
+                <a:effectLst/>
+              </a:rPr>
+              <a:t> </a:t>
+            </a:r>
+            <a:r>
+              <a:rPr lang="en-US" sz="2200" b="0" i="0" dirty="0" err="1">
+                <a:effectLst/>
+              </a:rPr>
+              <a:t>voor</a:t>
+            </a:r>
+            <a:r>
+              <a:rPr lang="en-US" sz="2200" b="0" i="0" dirty="0">
+                <a:effectLst/>
+              </a:rPr>
+              <a:t> </a:t>
+            </a:r>
+            <a:r>
+              <a:rPr lang="en-US" sz="2200" b="0" i="0" dirty="0" err="1">
+                <a:effectLst/>
+              </a:rPr>
+              <a:t>een</a:t>
+            </a:r>
+            <a:r>
+              <a:rPr lang="en-US" sz="2200" b="0" i="0" dirty="0">
+                <a:effectLst/>
+              </a:rPr>
+              <a:t> </a:t>
+            </a:r>
+            <a:r>
+              <a:rPr lang="en-US" sz="2200" b="0" i="0" dirty="0" err="1">
+                <a:effectLst/>
+              </a:rPr>
+              <a:t>specifiek</a:t>
+            </a:r>
+            <a:r>
+              <a:rPr lang="en-US" sz="2200" b="0" i="0" dirty="0">
+                <a:effectLst/>
+              </a:rPr>
+              <a:t> </a:t>
+            </a:r>
+            <a:r>
+              <a:rPr lang="en-US" sz="2200" b="0" i="0" dirty="0" err="1">
+                <a:effectLst/>
+              </a:rPr>
+              <a:t>deel</a:t>
+            </a:r>
+            <a:r>
+              <a:rPr lang="en-US" sz="2200" b="0" i="0" dirty="0">
+                <a:effectLst/>
+              </a:rPr>
+              <a:t> van de </a:t>
+            </a:r>
+            <a:r>
+              <a:rPr lang="en-US" sz="2200" b="0" i="0" dirty="0" err="1">
+                <a:effectLst/>
+              </a:rPr>
+              <a:t>gebruikersinterface</a:t>
+            </a:r>
+            <a:r>
+              <a:rPr lang="en-US" sz="2200" b="0" i="0" dirty="0">
+                <a:effectLst/>
+              </a:rPr>
+              <a:t> of </a:t>
+            </a:r>
+            <a:r>
+              <a:rPr lang="en-US" sz="2200" b="0" i="0" dirty="0" err="1">
+                <a:effectLst/>
+              </a:rPr>
+              <a:t>functionaliteit</a:t>
+            </a:r>
+            <a:r>
+              <a:rPr lang="en-US" sz="2200" b="0" i="0" dirty="0">
+                <a:effectLst/>
+              </a:rPr>
+              <a:t> van de </a:t>
+            </a:r>
+            <a:r>
+              <a:rPr lang="en-US" sz="2200" b="0" i="0" dirty="0" err="1">
+                <a:effectLst/>
+              </a:rPr>
+              <a:t>applicatie</a:t>
+            </a:r>
+            <a:r>
+              <a:rPr lang="en-US" sz="2200" b="0" i="0" dirty="0">
+                <a:effectLst/>
+              </a:rPr>
+              <a:t>.</a:t>
+            </a:r>
+            <a:endParaRPr lang="en-US" sz="2200" dirty="0"/>
+          </a:p>
+        </p:txBody>
+      </p:sp>
+      <p:sp>
+        <p:nvSpPr>
+          <p:cNvPr id="5" name="Tijdelijke aanduiding voor dianummer 4">
+            <a:extLst>
+              <a:ext uri="{FF2B5EF4-FFF2-40B4-BE49-F238E27FC236}">
+                <a16:creationId xmlns:a16="http://schemas.microsoft.com/office/drawing/2014/main" id="{1F4B8705-43D2-81D7-892A-CF752BAFC7AE}"/>
               </a:ext>
             </a:extLst>
           </p:cNvPr>
@@ -10771,12 +12433,12 @@
     </p:spTree>
     <p:extLst>
       <p:ext uri="{BB962C8B-B14F-4D97-AF65-F5344CB8AC3E}">
-        <p14:creationId xmlns:p14="http://schemas.microsoft.com/office/powerpoint/2010/main" val="1322456487"/>
+        <p14:creationId xmlns:p14="http://schemas.microsoft.com/office/powerpoint/2010/main" val="1968755801"/>
       </p:ext>
     </p:extLst>
   </p:cSld>
   <p:clrMapOvr>
-    <a:masterClrMapping/>
+    <a:overrideClrMapping bg1="dk1" tx1="lt1" bg2="dk2" tx2="lt2" accent1="accent1" accent2="accent2" accent3="accent3" accent4="accent4" accent5="accent5" accent6="accent6" hlink="hlink" folHlink="folHlink"/>
   </p:clrMapOvr>
 </p:sld>
 </file>
@@ -11022,9 +12684,10 @@
           <a:p>
             <a:pPr algn="r"/>
             <a:r>
-              <a:rPr lang="en-US" sz="8800"/>
-              <a:t>Case studies 🧳</a:t>
-            </a:r>
+              <a:rPr lang="nl-NL" sz="8800" dirty="0"/>
+              <a:t>Waarom (niet)?☯</a:t>
+            </a:r>
+            <a:endParaRPr lang="en-US" sz="8800" dirty="0"/>
           </a:p>
         </p:txBody>
       </p:sp>
@@ -11062,7 +12725,7 @@
                   <a:schemeClr val="tx1"/>
                 </a:solidFill>
               </a:rPr>
-              <a:t>Micro-frontends in de praktijk</a:t>
+              <a:t>De waarde van micro-frontends</a:t>
             </a:r>
           </a:p>
         </p:txBody>
@@ -11124,12 +12787,521 @@
     </p:spTree>
     <p:extLst>
       <p:ext uri="{BB962C8B-B14F-4D97-AF65-F5344CB8AC3E}">
-        <p14:creationId xmlns:p14="http://schemas.microsoft.com/office/powerpoint/2010/main" val="3392440280"/>
+        <p14:creationId xmlns:p14="http://schemas.microsoft.com/office/powerpoint/2010/main" val="1322456487"/>
       </p:ext>
     </p:extLst>
   </p:cSld>
   <p:clrMapOvr>
     <a:masterClrMapping/>
+  </p:clrMapOvr>
+</p:sld>
+</file>
+
+<file path=ppt/slides/slide8.xml><?xml version="1.0" encoding="utf-8"?>
+<p:sld xmlns:a="http://schemas.openxmlformats.org/drawingml/2006/main" xmlns:r="http://schemas.openxmlformats.org/officeDocument/2006/relationships" xmlns:p="http://schemas.openxmlformats.org/presentationml/2006/main">
+  <p:cSld>
+    <p:bg>
+      <p:bgPr>
+        <a:solidFill>
+          <a:schemeClr val="bg1"/>
+        </a:solidFill>
+        <a:effectLst/>
+      </p:bgPr>
+    </p:bg>
+    <p:spTree>
+      <p:nvGrpSpPr>
+        <p:cNvPr id="1" name="">
+          <a:extLst>
+            <a:ext uri="{FF2B5EF4-FFF2-40B4-BE49-F238E27FC236}">
+              <a16:creationId xmlns:a16="http://schemas.microsoft.com/office/drawing/2014/main" id="{D8D9737A-EEF5-A0AE-8062-218D1C12025F}"/>
+            </a:ext>
+          </a:extLst>
+        </p:cNvPr>
+        <p:cNvGrpSpPr/>
+        <p:nvPr/>
+      </p:nvGrpSpPr>
+      <p:grpSpPr>
+        <a:xfrm>
+          <a:off x="0" y="0"/>
+          <a:ext cx="0" cy="0"/>
+          <a:chOff x="0" y="0"/>
+          <a:chExt cx="0" cy="0"/>
+        </a:xfrm>
+      </p:grpSpPr>
+      <p:sp>
+        <p:nvSpPr>
+          <p:cNvPr id="10" name="Rectangle 9">
+            <a:extLst>
+              <a:ext uri="{FF2B5EF4-FFF2-40B4-BE49-F238E27FC236}">
+                <a16:creationId xmlns:a16="http://schemas.microsoft.com/office/drawing/2014/main" id="{09A1C012-8297-4361-ACE8-A2509FB18911}"/>
+              </a:ext>
+              <a:ext uri="{C183D7F6-B498-43B3-948B-1728B52AA6E4}">
+                <adec:decorative xmlns:adec="http://schemas.microsoft.com/office/drawing/2017/decorative" val="1"/>
+              </a:ext>
+            </a:extLst>
+          </p:cNvPr>
+          <p:cNvSpPr>
+            <a:spLocks noGrp="1" noRot="1" noChangeAspect="1" noMove="1" noResize="1" noEditPoints="1" noAdjustHandles="1" noChangeArrowheads="1" noChangeShapeType="1" noTextEdit="1"/>
+          </p:cNvSpPr>
+          <p:nvPr>
+            <p:extLst>
+              <p:ext uri="{386F3935-93C4-4BCD-93E2-E3B085C9AB24}">
+                <p16:designElem xmlns:p16="http://schemas.microsoft.com/office/powerpoint/2015/main" val="1"/>
+              </p:ext>
+            </p:extLst>
+          </p:nvPr>
+        </p:nvSpPr>
+        <p:spPr>
+          <a:xfrm>
+            <a:off x="0" y="4206240"/>
+            <a:ext cx="12192000" cy="2651760"/>
+          </a:xfrm>
+          <a:prstGeom prst="rect">
+            <a:avLst/>
+          </a:prstGeom>
+          <a:solidFill>
+            <a:schemeClr val="tx1"/>
+          </a:solidFill>
+          <a:ln>
+            <a:noFill/>
+          </a:ln>
+        </p:spPr>
+        <p:style>
+          <a:lnRef idx="2">
+            <a:schemeClr val="accent1">
+              <a:shade val="50000"/>
+            </a:schemeClr>
+          </a:lnRef>
+          <a:fillRef idx="1">
+            <a:schemeClr val="accent1"/>
+          </a:fillRef>
+          <a:effectRef idx="0">
+            <a:schemeClr val="accent1"/>
+          </a:effectRef>
+          <a:fontRef idx="minor">
+            <a:schemeClr val="lt1"/>
+          </a:fontRef>
+        </p:style>
+        <p:txBody>
+          <a:bodyPr rtlCol="0" anchor="ctr"/>
+          <a:lstStyle/>
+          <a:p>
+            <a:pPr algn="ctr"/>
+            <a:endParaRPr lang="en-US"/>
+          </a:p>
+        </p:txBody>
+      </p:sp>
+      <p:sp useBgFill="1">
+        <p:nvSpPr>
+          <p:cNvPr id="12" name="Rectangle 11">
+            <a:extLst>
+              <a:ext uri="{FF2B5EF4-FFF2-40B4-BE49-F238E27FC236}">
+                <a16:creationId xmlns:a16="http://schemas.microsoft.com/office/drawing/2014/main" id="{4AA13AD3-0A4F-475A-BEBB-DEEFF5C096C3}"/>
+              </a:ext>
+              <a:ext uri="{C183D7F6-B498-43B3-948B-1728B52AA6E4}">
+                <adec:decorative xmlns:adec="http://schemas.microsoft.com/office/drawing/2017/decorative" val="1"/>
+              </a:ext>
+            </a:extLst>
+          </p:cNvPr>
+          <p:cNvSpPr>
+            <a:spLocks noGrp="1" noRot="1" noChangeAspect="1" noMove="1" noResize="1" noEditPoints="1" noAdjustHandles="1" noChangeArrowheads="1" noChangeShapeType="1" noTextEdit="1"/>
+          </p:cNvSpPr>
+          <p:nvPr>
+            <p:extLst>
+              <p:ext uri="{386F3935-93C4-4BCD-93E2-E3B085C9AB24}">
+                <p16:designElem xmlns:p16="http://schemas.microsoft.com/office/powerpoint/2015/main" val="1"/>
+              </p:ext>
+            </p:extLst>
+          </p:nvPr>
+        </p:nvSpPr>
+        <p:spPr>
+          <a:xfrm>
+            <a:off x="0" y="0"/>
+            <a:ext cx="12192000" cy="6858000"/>
+          </a:xfrm>
+          <a:prstGeom prst="rect">
+            <a:avLst/>
+          </a:prstGeom>
+          <a:ln>
+            <a:noFill/>
+          </a:ln>
+        </p:spPr>
+        <p:style>
+          <a:lnRef idx="2">
+            <a:schemeClr val="accent1">
+              <a:shade val="50000"/>
+            </a:schemeClr>
+          </a:lnRef>
+          <a:fillRef idx="1">
+            <a:schemeClr val="accent1"/>
+          </a:fillRef>
+          <a:effectRef idx="0">
+            <a:schemeClr val="accent1"/>
+          </a:effectRef>
+          <a:fontRef idx="minor">
+            <a:schemeClr val="lt1"/>
+          </a:fontRef>
+        </p:style>
+        <p:txBody>
+          <a:bodyPr rtlCol="0" anchor="ctr"/>
+          <a:lstStyle/>
+          <a:p>
+            <a:pPr algn="ctr"/>
+            <a:endParaRPr lang="en-US"/>
+          </a:p>
+        </p:txBody>
+      </p:sp>
+      <p:sp>
+        <p:nvSpPr>
+          <p:cNvPr id="14" name="Rectangle 13">
+            <a:extLst>
+              <a:ext uri="{FF2B5EF4-FFF2-40B4-BE49-F238E27FC236}">
+                <a16:creationId xmlns:a16="http://schemas.microsoft.com/office/drawing/2014/main" id="{205BB74C-33FB-4335-8808-49E247F7BF75}"/>
+              </a:ext>
+              <a:ext uri="{C183D7F6-B498-43B3-948B-1728B52AA6E4}">
+                <adec:decorative xmlns:adec="http://schemas.microsoft.com/office/drawing/2017/decorative" val="1"/>
+              </a:ext>
+            </a:extLst>
+          </p:cNvPr>
+          <p:cNvSpPr>
+            <a:spLocks noGrp="1" noRot="1" noChangeAspect="1" noMove="1" noResize="1" noEditPoints="1" noAdjustHandles="1" noChangeArrowheads="1" noChangeShapeType="1" noTextEdit="1"/>
+          </p:cNvSpPr>
+          <p:nvPr>
+            <p:extLst>
+              <p:ext uri="{386F3935-93C4-4BCD-93E2-E3B085C9AB24}">
+                <p16:designElem xmlns:p16="http://schemas.microsoft.com/office/powerpoint/2015/main" val="1"/>
+              </p:ext>
+            </p:extLst>
+          </p:nvPr>
+        </p:nvSpPr>
+        <p:spPr>
+          <a:xfrm>
+            <a:off x="1" y="1225106"/>
+            <a:ext cx="12192000" cy="3788958"/>
+          </a:xfrm>
+          <a:prstGeom prst="rect">
+            <a:avLst/>
+          </a:prstGeom>
+          <a:solidFill>
+            <a:schemeClr val="tx1"/>
+          </a:solidFill>
+          <a:ln>
+            <a:noFill/>
+          </a:ln>
+        </p:spPr>
+        <p:style>
+          <a:lnRef idx="2">
+            <a:schemeClr val="accent1">
+              <a:shade val="50000"/>
+            </a:schemeClr>
+          </a:lnRef>
+          <a:fillRef idx="1">
+            <a:schemeClr val="accent1"/>
+          </a:fillRef>
+          <a:effectRef idx="0">
+            <a:schemeClr val="accent1"/>
+          </a:effectRef>
+          <a:fontRef idx="minor">
+            <a:schemeClr val="lt1"/>
+          </a:fontRef>
+        </p:style>
+        <p:txBody>
+          <a:bodyPr rtlCol="0" anchor="ctr"/>
+          <a:lstStyle/>
+          <a:p>
+            <a:pPr algn="ctr"/>
+            <a:endParaRPr lang="en-US"/>
+          </a:p>
+        </p:txBody>
+      </p:sp>
+      <p:sp>
+        <p:nvSpPr>
+          <p:cNvPr id="2" name="Titel 1">
+            <a:extLst>
+              <a:ext uri="{FF2B5EF4-FFF2-40B4-BE49-F238E27FC236}">
+                <a16:creationId xmlns:a16="http://schemas.microsoft.com/office/drawing/2014/main" id="{0255DB92-E25F-869B-873E-CDD78B79D6A6}"/>
+              </a:ext>
+            </a:extLst>
+          </p:cNvPr>
+          <p:cNvSpPr>
+            <a:spLocks noGrp="1"/>
+          </p:cNvSpPr>
+          <p:nvPr>
+            <p:ph type="title"/>
+          </p:nvPr>
+        </p:nvSpPr>
+        <p:spPr>
+          <a:xfrm>
+            <a:off x="960120" y="1841412"/>
+            <a:ext cx="10268712" cy="2688020"/>
+          </a:xfrm>
+        </p:spPr>
+        <p:txBody>
+          <a:bodyPr vert="horz" lIns="91440" tIns="45720" rIns="91440" bIns="45720" rtlCol="0" anchor="ctr">
+            <a:noAutofit/>
+          </a:bodyPr>
+          <a:lstStyle/>
+          <a:p>
+            <a:r>
+              <a:rPr lang="en-US" sz="2800" dirty="0" err="1"/>
+              <a:t>Waarom</a:t>
+            </a:r>
+            <a:r>
+              <a:rPr lang="en-US" sz="2800" dirty="0"/>
+              <a:t>?</a:t>
+            </a:r>
+            <a:br>
+              <a:rPr lang="en-US" sz="2800" dirty="0"/>
+            </a:br>
+            <a:br>
+              <a:rPr lang="en-US" sz="700" dirty="0"/>
+            </a:br>
+            <a:br>
+              <a:rPr lang="en-US" sz="700" dirty="0"/>
+            </a:br>
+            <a:r>
+              <a:rPr lang="nl-NL" sz="1400" b="1" cap="none" dirty="0" err="1">
+                <a:latin typeface="Arial" panose="020B0604020202020204" pitchFamily="34" charset="0"/>
+                <a:cs typeface="Arial" panose="020B0604020202020204" pitchFamily="34" charset="0"/>
+              </a:rPr>
+              <a:t>Modulariteit</a:t>
+            </a:r>
+            <a:r>
+              <a:rPr lang="nl-NL" sz="1400" b="1" cap="none" dirty="0">
+                <a:latin typeface="Arial" panose="020B0604020202020204" pitchFamily="34" charset="0"/>
+                <a:cs typeface="Arial" panose="020B0604020202020204" pitchFamily="34" charset="0"/>
+              </a:rPr>
+              <a:t>: </a:t>
+            </a:r>
+            <a:r>
+              <a:rPr lang="nl-NL" sz="1400" cap="none" dirty="0" err="1">
+                <a:latin typeface="Arial" panose="020B0604020202020204" pitchFamily="34" charset="0"/>
+                <a:cs typeface="Arial" panose="020B0604020202020204" pitchFamily="34" charset="0"/>
+              </a:rPr>
+              <a:t>microfrontends</a:t>
+            </a:r>
+            <a:r>
+              <a:rPr lang="nl-NL" sz="1400" cap="none" dirty="0">
+                <a:latin typeface="Arial" panose="020B0604020202020204" pitchFamily="34" charset="0"/>
+                <a:cs typeface="Arial" panose="020B0604020202020204" pitchFamily="34" charset="0"/>
+              </a:rPr>
+              <a:t> laten teams toe om onafhankelijk aan specifieke delen van de applicatie te werken.</a:t>
+            </a:r>
+            <a:br>
+              <a:rPr lang="nl-NL" sz="1400" cap="none" dirty="0">
+                <a:latin typeface="Arial" panose="020B0604020202020204" pitchFamily="34" charset="0"/>
+                <a:cs typeface="Arial" panose="020B0604020202020204" pitchFamily="34" charset="0"/>
+              </a:rPr>
+            </a:br>
+            <a:br>
+              <a:rPr lang="nl-NL" sz="1400" cap="none" dirty="0">
+                <a:latin typeface="Arial" panose="020B0604020202020204" pitchFamily="34" charset="0"/>
+                <a:cs typeface="Arial" panose="020B0604020202020204" pitchFamily="34" charset="0"/>
+              </a:rPr>
+            </a:br>
+            <a:r>
+              <a:rPr lang="nl-NL" sz="1400" b="1" cap="none" dirty="0">
+                <a:latin typeface="Arial" panose="020B0604020202020204" pitchFamily="34" charset="0"/>
+                <a:cs typeface="Arial" panose="020B0604020202020204" pitchFamily="34" charset="0"/>
+              </a:rPr>
+              <a:t>Technologische diversiteit: </a:t>
+            </a:r>
+            <a:r>
+              <a:rPr lang="nl-NL" sz="1400" cap="none" dirty="0">
+                <a:latin typeface="Arial" panose="020B0604020202020204" pitchFamily="34" charset="0"/>
+                <a:cs typeface="Arial" panose="020B0604020202020204" pitchFamily="34" charset="0"/>
+              </a:rPr>
+              <a:t>verschillende delen van de applicatie kunnen verschillende technologieën gebruiken.</a:t>
+            </a:r>
+            <a:br>
+              <a:rPr lang="nl-NL" sz="1400" cap="none" dirty="0">
+                <a:latin typeface="Arial" panose="020B0604020202020204" pitchFamily="34" charset="0"/>
+                <a:cs typeface="Arial" panose="020B0604020202020204" pitchFamily="34" charset="0"/>
+              </a:rPr>
+            </a:br>
+            <a:br>
+              <a:rPr lang="nl-NL" sz="1400" cap="none" dirty="0">
+                <a:latin typeface="Arial" panose="020B0604020202020204" pitchFamily="34" charset="0"/>
+                <a:cs typeface="Arial" panose="020B0604020202020204" pitchFamily="34" charset="0"/>
+              </a:rPr>
+            </a:br>
+            <a:r>
+              <a:rPr lang="nl-NL" sz="1400" b="1" cap="none" dirty="0">
+                <a:latin typeface="Arial" panose="020B0604020202020204" pitchFamily="34" charset="0"/>
+                <a:cs typeface="Arial" panose="020B0604020202020204" pitchFamily="34" charset="0"/>
+              </a:rPr>
+              <a:t>Schaalbaarheid: </a:t>
+            </a:r>
+            <a:r>
+              <a:rPr lang="nl-NL" sz="1400" cap="none" dirty="0">
+                <a:latin typeface="Arial" panose="020B0604020202020204" pitchFamily="34" charset="0"/>
+                <a:cs typeface="Arial" panose="020B0604020202020204" pitchFamily="34" charset="0"/>
+              </a:rPr>
+              <a:t>teams kunnen afzonderlijke delen van de applicatie onafhankelijk schalen.</a:t>
+            </a:r>
+            <a:br>
+              <a:rPr lang="nl-NL" sz="1400" cap="none" dirty="0">
+                <a:latin typeface="Arial" panose="020B0604020202020204" pitchFamily="34" charset="0"/>
+                <a:cs typeface="Arial" panose="020B0604020202020204" pitchFamily="34" charset="0"/>
+              </a:rPr>
+            </a:br>
+            <a:br>
+              <a:rPr lang="nl-NL" sz="1400" cap="none" dirty="0">
+                <a:latin typeface="Arial" panose="020B0604020202020204" pitchFamily="34" charset="0"/>
+                <a:cs typeface="Arial" panose="020B0604020202020204" pitchFamily="34" charset="0"/>
+              </a:rPr>
+            </a:br>
+            <a:r>
+              <a:rPr lang="nl-NL" sz="1400" b="1" cap="none" dirty="0">
+                <a:latin typeface="Arial" panose="020B0604020202020204" pitchFamily="34" charset="0"/>
+                <a:cs typeface="Arial" panose="020B0604020202020204" pitchFamily="34" charset="0"/>
+              </a:rPr>
+              <a:t>Herbruikbaarheid: </a:t>
+            </a:r>
+            <a:r>
+              <a:rPr lang="nl-NL" sz="1400" cap="none" dirty="0">
+                <a:latin typeface="Arial" panose="020B0604020202020204" pitchFamily="34" charset="0"/>
+                <a:cs typeface="Arial" panose="020B0604020202020204" pitchFamily="34" charset="0"/>
+              </a:rPr>
+              <a:t>componenten kunnen gemakkelijk worden gedeeld tussen verschillende delen van de applicatie.</a:t>
+            </a:r>
+            <a:br>
+              <a:rPr lang="nl-NL" sz="1400" cap="none" dirty="0">
+                <a:latin typeface="Arial" panose="020B0604020202020204" pitchFamily="34" charset="0"/>
+                <a:cs typeface="Arial" panose="020B0604020202020204" pitchFamily="34" charset="0"/>
+              </a:rPr>
+            </a:br>
+            <a:br>
+              <a:rPr lang="nl-NL" sz="1400" cap="none" dirty="0">
+                <a:latin typeface="Arial" panose="020B0604020202020204" pitchFamily="34" charset="0"/>
+                <a:cs typeface="Arial" panose="020B0604020202020204" pitchFamily="34" charset="0"/>
+              </a:rPr>
+            </a:br>
+            <a:r>
+              <a:rPr lang="nl-NL" sz="1400" b="1" cap="none" dirty="0">
+                <a:latin typeface="Arial" panose="020B0604020202020204" pitchFamily="34" charset="0"/>
+                <a:cs typeface="Arial" panose="020B0604020202020204" pitchFamily="34" charset="0"/>
+              </a:rPr>
+              <a:t>Onafhankelijke implementatie en </a:t>
+            </a:r>
+            <a:r>
+              <a:rPr lang="nl-NL" sz="1400" b="1" cap="none" dirty="0" err="1">
+                <a:latin typeface="Arial" panose="020B0604020202020204" pitchFamily="34" charset="0"/>
+                <a:cs typeface="Arial" panose="020B0604020202020204" pitchFamily="34" charset="0"/>
+              </a:rPr>
+              <a:t>deployment</a:t>
+            </a:r>
+            <a:r>
+              <a:rPr lang="nl-NL" sz="1400" b="1" cap="none" dirty="0">
+                <a:latin typeface="Arial" panose="020B0604020202020204" pitchFamily="34" charset="0"/>
+                <a:cs typeface="Arial" panose="020B0604020202020204" pitchFamily="34" charset="0"/>
+              </a:rPr>
+              <a:t>: </a:t>
+            </a:r>
+            <a:r>
+              <a:rPr lang="nl-NL" sz="1400" cap="none" dirty="0" err="1">
+                <a:latin typeface="Arial" panose="020B0604020202020204" pitchFamily="34" charset="0"/>
+                <a:cs typeface="Arial" panose="020B0604020202020204" pitchFamily="34" charset="0"/>
+              </a:rPr>
+              <a:t>microfrontends</a:t>
+            </a:r>
+            <a:r>
+              <a:rPr lang="nl-NL" sz="1400" cap="none" dirty="0">
+                <a:latin typeface="Arial" panose="020B0604020202020204" pitchFamily="34" charset="0"/>
+                <a:cs typeface="Arial" panose="020B0604020202020204" pitchFamily="34" charset="0"/>
+              </a:rPr>
+              <a:t> kunnen afzonderlijk worden geïmplementeerd en </a:t>
+            </a:r>
+            <a:r>
+              <a:rPr lang="nl-NL" sz="1400" cap="none" dirty="0" err="1">
+                <a:latin typeface="Arial" panose="020B0604020202020204" pitchFamily="34" charset="0"/>
+                <a:cs typeface="Arial" panose="020B0604020202020204" pitchFamily="34" charset="0"/>
+              </a:rPr>
+              <a:t>gedeployed</a:t>
+            </a:r>
+            <a:r>
+              <a:rPr lang="nl-NL" sz="1400" cap="none" dirty="0">
+                <a:latin typeface="Arial" panose="020B0604020202020204" pitchFamily="34" charset="0"/>
+                <a:cs typeface="Arial" panose="020B0604020202020204" pitchFamily="34" charset="0"/>
+              </a:rPr>
+              <a:t>.</a:t>
+            </a:r>
+            <a:br>
+              <a:rPr lang="nl-NL" sz="1400" cap="none" dirty="0">
+                <a:latin typeface="Arial" panose="020B0604020202020204" pitchFamily="34" charset="0"/>
+                <a:cs typeface="Arial" panose="020B0604020202020204" pitchFamily="34" charset="0"/>
+              </a:rPr>
+            </a:br>
+            <a:endParaRPr lang="en-US" sz="700" dirty="0">
+              <a:latin typeface="Arial" panose="020B0604020202020204" pitchFamily="34" charset="0"/>
+              <a:cs typeface="Arial" panose="020B0604020202020204" pitchFamily="34" charset="0"/>
+            </a:endParaRPr>
+          </a:p>
+        </p:txBody>
+      </p:sp>
+      <p:sp>
+        <p:nvSpPr>
+          <p:cNvPr id="5" name="Tijdelijke aanduiding voor dianummer 4">
+            <a:extLst>
+              <a:ext uri="{FF2B5EF4-FFF2-40B4-BE49-F238E27FC236}">
+                <a16:creationId xmlns:a16="http://schemas.microsoft.com/office/drawing/2014/main" id="{C4A335A0-76AD-F300-A12F-DEA6AD54660A}"/>
+              </a:ext>
+            </a:extLst>
+          </p:cNvPr>
+          <p:cNvSpPr>
+            <a:spLocks noGrp="1"/>
+          </p:cNvSpPr>
+          <p:nvPr>
+            <p:ph type="sldNum" sz="quarter" idx="12"/>
+          </p:nvPr>
+        </p:nvSpPr>
+        <p:spPr>
+          <a:xfrm>
+            <a:off x="10296144" y="6356350"/>
+            <a:ext cx="932688" cy="365125"/>
+          </a:xfrm>
+        </p:spPr>
+        <p:txBody>
+          <a:bodyPr vert="horz" lIns="91440" tIns="45720" rIns="91440" bIns="45720" rtlCol="0" anchor="ctr">
+            <a:normAutofit/>
+          </a:bodyPr>
+          <a:lstStyle/>
+          <a:p>
+            <a:pPr algn="l">
+              <a:spcAft>
+                <a:spcPts val="600"/>
+              </a:spcAft>
+            </a:pPr>
+            <a:fld id="{294A09A9-5501-47C1-A89A-A340965A2BE2}" type="slidenum">
+              <a:rPr lang="en-US">
+                <a:solidFill>
+                  <a:schemeClr val="tx1"/>
+                </a:solidFill>
+              </a:rPr>
+              <a:pPr algn="l">
+                <a:spcAft>
+                  <a:spcPts val="600"/>
+                </a:spcAft>
+              </a:pPr>
+              <a:t>8</a:t>
+            </a:fld>
+            <a:endParaRPr lang="en-US">
+              <a:solidFill>
+                <a:schemeClr val="tx1"/>
+              </a:solidFill>
+            </a:endParaRPr>
+          </a:p>
+        </p:txBody>
+      </p:sp>
+    </p:spTree>
+    <p:extLst>
+      <p:ext uri="{BB962C8B-B14F-4D97-AF65-F5344CB8AC3E}">
+        <p14:creationId xmlns:p14="http://schemas.microsoft.com/office/powerpoint/2010/main" val="4053744588"/>
+      </p:ext>
+    </p:extLst>
+  </p:cSld>
+  <p:clrMapOvr>
+    <a:overrideClrMapping bg1="dk1" tx1="lt1" bg2="dk2" tx2="lt2" accent1="accent1" accent2="accent2" accent3="accent3" accent4="accent4" accent5="accent5" accent6="accent6" hlink="hlink" folHlink="folHlink"/>
   </p:clrMapOvr>
   <p:timing>
     <p:tnLst>
@@ -11159,414 +13331,8 @@
                                   <p:stCondLst>
                                     <p:cond delay="500"/>
                                   </p:stCondLst>
-                                  <p:iterate type="lt">
-                                    <p:tmPct val="10000"/>
-                                  </p:iterate>
-                                  <p:childTnLst>
-                                    <p:set>
-                                      <p:cBhvr>
-                                        <p:cTn id="6" dur="1" fill="hold">
-                                          <p:stCondLst>
-                                            <p:cond delay="0"/>
-                                          </p:stCondLst>
-                                        </p:cTn>
-                                        <p:tgtEl>
-                                          <p:spTgt spid="23"/>
-                                        </p:tgtEl>
-                                        <p:attrNameLst>
-                                          <p:attrName>style.visibility</p:attrName>
-                                        </p:attrNameLst>
-                                      </p:cBhvr>
-                                      <p:to>
-                                        <p:strVal val="visible"/>
-                                      </p:to>
-                                    </p:set>
-                                    <p:animEffect transition="in" filter="fade">
-                                      <p:cBhvr>
-                                        <p:cTn id="7" dur="400"/>
-                                        <p:tgtEl>
-                                          <p:spTgt spid="23"/>
-                                        </p:tgtEl>
-                                      </p:cBhvr>
-                                    </p:animEffect>
-                                  </p:childTnLst>
-                                </p:cTn>
-                              </p:par>
-                            </p:childTnLst>
-                          </p:cTn>
-                        </p:par>
-                      </p:childTnLst>
-                    </p:cTn>
-                  </p:par>
-                </p:childTnLst>
-              </p:cTn>
-              <p:prevCondLst>
-                <p:cond evt="onPrev" delay="0">
-                  <p:tgtEl>
-                    <p:sldTgt/>
-                  </p:tgtEl>
-                </p:cond>
-              </p:prevCondLst>
-              <p:nextCondLst>
-                <p:cond evt="onNext" delay="0">
-                  <p:tgtEl>
-                    <p:sldTgt/>
-                  </p:tgtEl>
-                </p:cond>
-              </p:nextCondLst>
-            </p:seq>
-          </p:childTnLst>
-        </p:cTn>
-      </p:par>
-    </p:tnLst>
-    <p:bldLst>
-      <p:bldP spid="23" grpId="0"/>
-    </p:bldLst>
-  </p:timing>
-</p:sld>
-</file>
-
-<file path=ppt/slides/slide8.xml><?xml version="1.0" encoding="utf-8"?>
-<p:sld xmlns:a="http://schemas.openxmlformats.org/drawingml/2006/main" xmlns:r="http://schemas.openxmlformats.org/officeDocument/2006/relationships" xmlns:p="http://schemas.openxmlformats.org/presentationml/2006/main">
-  <p:cSld>
-    <p:bg>
-      <p:bgPr>
-        <a:solidFill>
-          <a:schemeClr val="bg1"/>
-        </a:solidFill>
-        <a:effectLst/>
-      </p:bgPr>
-    </p:bg>
-    <p:spTree>
-      <p:nvGrpSpPr>
-        <p:cNvPr id="1" name=""/>
-        <p:cNvGrpSpPr/>
-        <p:nvPr/>
-      </p:nvGrpSpPr>
-      <p:grpSpPr>
-        <a:xfrm>
-          <a:off x="0" y="0"/>
-          <a:ext cx="0" cy="0"/>
-          <a:chOff x="0" y="0"/>
-          <a:chExt cx="0" cy="0"/>
-        </a:xfrm>
-      </p:grpSpPr>
-      <p:sp>
-        <p:nvSpPr>
-          <p:cNvPr id="28" name="Rectangle 27">
-            <a:extLst>
-              <a:ext uri="{FF2B5EF4-FFF2-40B4-BE49-F238E27FC236}">
-                <a16:creationId xmlns:a16="http://schemas.microsoft.com/office/drawing/2014/main" id="{09A1C012-8297-4361-ACE8-A2509FB18911}"/>
-              </a:ext>
-              <a:ext uri="{C183D7F6-B498-43B3-948B-1728B52AA6E4}">
-                <adec:decorative xmlns:adec="http://schemas.microsoft.com/office/drawing/2017/decorative" val="1"/>
-              </a:ext>
-            </a:extLst>
-          </p:cNvPr>
-          <p:cNvSpPr>
-            <a:spLocks noGrp="1" noRot="1" noChangeAspect="1" noMove="1" noResize="1" noEditPoints="1" noAdjustHandles="1" noChangeArrowheads="1" noChangeShapeType="1" noTextEdit="1"/>
-          </p:cNvSpPr>
-          <p:nvPr>
-            <p:extLst>
-              <p:ext uri="{386F3935-93C4-4BCD-93E2-E3B085C9AB24}">
-                <p16:designElem xmlns:p16="http://schemas.microsoft.com/office/powerpoint/2015/main" val="1"/>
-              </p:ext>
-            </p:extLst>
-          </p:nvPr>
-        </p:nvSpPr>
-        <p:spPr>
-          <a:xfrm>
-            <a:off x="0" y="4206240"/>
-            <a:ext cx="12192000" cy="2651760"/>
-          </a:xfrm>
-          <a:prstGeom prst="rect">
-            <a:avLst/>
-          </a:prstGeom>
-          <a:solidFill>
-            <a:schemeClr val="tx1"/>
-          </a:solidFill>
-          <a:ln>
-            <a:noFill/>
-          </a:ln>
-        </p:spPr>
-        <p:style>
-          <a:lnRef idx="2">
-            <a:schemeClr val="accent1">
-              <a:shade val="50000"/>
-            </a:schemeClr>
-          </a:lnRef>
-          <a:fillRef idx="1">
-            <a:schemeClr val="accent1"/>
-          </a:fillRef>
-          <a:effectRef idx="0">
-            <a:schemeClr val="accent1"/>
-          </a:effectRef>
-          <a:fontRef idx="minor">
-            <a:schemeClr val="lt1"/>
-          </a:fontRef>
-        </p:style>
-        <p:txBody>
-          <a:bodyPr rtlCol="0" anchor="ctr"/>
-          <a:lstStyle/>
-          <a:p>
-            <a:pPr algn="ctr"/>
-            <a:endParaRPr lang="en-US"/>
-          </a:p>
-        </p:txBody>
-      </p:sp>
-      <p:sp useBgFill="1">
-        <p:nvSpPr>
-          <p:cNvPr id="30" name="Rectangle 29">
-            <a:extLst>
-              <a:ext uri="{FF2B5EF4-FFF2-40B4-BE49-F238E27FC236}">
-                <a16:creationId xmlns:a16="http://schemas.microsoft.com/office/drawing/2014/main" id="{4AA13AD3-0A4F-475A-BEBB-DEEFF5C096C3}"/>
-              </a:ext>
-              <a:ext uri="{C183D7F6-B498-43B3-948B-1728B52AA6E4}">
-                <adec:decorative xmlns:adec="http://schemas.microsoft.com/office/drawing/2017/decorative" val="1"/>
-              </a:ext>
-            </a:extLst>
-          </p:cNvPr>
-          <p:cNvSpPr>
-            <a:spLocks noGrp="1" noRot="1" noChangeAspect="1" noMove="1" noResize="1" noEditPoints="1" noAdjustHandles="1" noChangeArrowheads="1" noChangeShapeType="1" noTextEdit="1"/>
-          </p:cNvSpPr>
-          <p:nvPr>
-            <p:extLst>
-              <p:ext uri="{386F3935-93C4-4BCD-93E2-E3B085C9AB24}">
-                <p16:designElem xmlns:p16="http://schemas.microsoft.com/office/powerpoint/2015/main" val="1"/>
-              </p:ext>
-            </p:extLst>
-          </p:nvPr>
-        </p:nvSpPr>
-        <p:spPr>
-          <a:xfrm>
-            <a:off x="0" y="0"/>
-            <a:ext cx="12192000" cy="6858000"/>
-          </a:xfrm>
-          <a:prstGeom prst="rect">
-            <a:avLst/>
-          </a:prstGeom>
-          <a:ln>
-            <a:noFill/>
-          </a:ln>
-        </p:spPr>
-        <p:style>
-          <a:lnRef idx="2">
-            <a:schemeClr val="accent1">
-              <a:shade val="50000"/>
-            </a:schemeClr>
-          </a:lnRef>
-          <a:fillRef idx="1">
-            <a:schemeClr val="accent1"/>
-          </a:fillRef>
-          <a:effectRef idx="0">
-            <a:schemeClr val="accent1"/>
-          </a:effectRef>
-          <a:fontRef idx="minor">
-            <a:schemeClr val="lt1"/>
-          </a:fontRef>
-        </p:style>
-        <p:txBody>
-          <a:bodyPr rtlCol="0" anchor="ctr"/>
-          <a:lstStyle/>
-          <a:p>
-            <a:pPr algn="ctr"/>
-            <a:endParaRPr lang="en-US"/>
-          </a:p>
-        </p:txBody>
-      </p:sp>
-      <p:sp>
-        <p:nvSpPr>
-          <p:cNvPr id="32" name="Rectangle 31">
-            <a:extLst>
-              <a:ext uri="{FF2B5EF4-FFF2-40B4-BE49-F238E27FC236}">
-                <a16:creationId xmlns:a16="http://schemas.microsoft.com/office/drawing/2014/main" id="{D65E0E3C-32F3-480B-9842-7611BBE2EE9F}"/>
-              </a:ext>
-              <a:ext uri="{C183D7F6-B498-43B3-948B-1728B52AA6E4}">
-                <adec:decorative xmlns:adec="http://schemas.microsoft.com/office/drawing/2017/decorative" val="1"/>
-              </a:ext>
-            </a:extLst>
-          </p:cNvPr>
-          <p:cNvSpPr>
-            <a:spLocks noGrp="1" noRot="1" noChangeAspect="1" noMove="1" noResize="1" noEditPoints="1" noAdjustHandles="1" noChangeArrowheads="1" noChangeShapeType="1" noTextEdit="1"/>
-          </p:cNvSpPr>
-          <p:nvPr>
-            <p:extLst>
-              <p:ext uri="{386F3935-93C4-4BCD-93E2-E3B085C9AB24}">
-                <p16:designElem xmlns:p16="http://schemas.microsoft.com/office/powerpoint/2015/main" val="1"/>
-              </p:ext>
-            </p:extLst>
-          </p:nvPr>
-        </p:nvSpPr>
-        <p:spPr>
-          <a:xfrm>
-            <a:off x="0" y="0"/>
-            <a:ext cx="12192000" cy="4206240"/>
-          </a:xfrm>
-          <a:prstGeom prst="rect">
-            <a:avLst/>
-          </a:prstGeom>
-          <a:solidFill>
-            <a:schemeClr val="tx1"/>
-          </a:solidFill>
-          <a:ln>
-            <a:noFill/>
-          </a:ln>
-        </p:spPr>
-        <p:style>
-          <a:lnRef idx="2">
-            <a:schemeClr val="accent1">
-              <a:shade val="50000"/>
-            </a:schemeClr>
-          </a:lnRef>
-          <a:fillRef idx="1">
-            <a:schemeClr val="accent1"/>
-          </a:fillRef>
-          <a:effectRef idx="0">
-            <a:schemeClr val="accent1"/>
-          </a:effectRef>
-          <a:fontRef idx="minor">
-            <a:schemeClr val="lt1"/>
-          </a:fontRef>
-        </p:style>
-        <p:txBody>
-          <a:bodyPr rtlCol="0" anchor="ctr"/>
-          <a:lstStyle/>
-          <a:p>
-            <a:pPr algn="ctr"/>
-            <a:endParaRPr lang="en-US"/>
-          </a:p>
-        </p:txBody>
-      </p:sp>
-      <p:sp>
-        <p:nvSpPr>
-          <p:cNvPr id="2" name="Titel 1">
-            <a:extLst>
-              <a:ext uri="{FF2B5EF4-FFF2-40B4-BE49-F238E27FC236}">
-                <a16:creationId xmlns:a16="http://schemas.microsoft.com/office/drawing/2014/main" id="{8D9583FE-B306-07EB-250E-9729557A9D7E}"/>
-              </a:ext>
-            </a:extLst>
-          </p:cNvPr>
-          <p:cNvSpPr>
-            <a:spLocks noGrp="1"/>
-          </p:cNvSpPr>
-          <p:nvPr>
-            <p:ph type="title"/>
-          </p:nvPr>
-        </p:nvSpPr>
-        <p:spPr>
-          <a:xfrm>
-            <a:off x="960120" y="640080"/>
-            <a:ext cx="10268712" cy="3227832"/>
-          </a:xfrm>
-        </p:spPr>
-        <p:txBody>
-          <a:bodyPr vert="horz" lIns="91440" tIns="45720" rIns="91440" bIns="45720" rtlCol="0" anchor="b">
-            <a:normAutofit/>
-          </a:bodyPr>
-          <a:lstStyle/>
-          <a:p>
-            <a:pPr algn="ctr"/>
-            <a:r>
-              <a:rPr lang="en-US" sz="8800" dirty="0"/>
-              <a:t>Spotify</a:t>
-            </a:r>
-          </a:p>
-        </p:txBody>
-      </p:sp>
-      <p:sp>
-        <p:nvSpPr>
-          <p:cNvPr id="5" name="Tijdelijke aanduiding voor dianummer 4">
-            <a:extLst>
-              <a:ext uri="{FF2B5EF4-FFF2-40B4-BE49-F238E27FC236}">
-                <a16:creationId xmlns:a16="http://schemas.microsoft.com/office/drawing/2014/main" id="{37522FDD-ED25-AE92-69CE-D1A8DA8B36EF}"/>
-              </a:ext>
-            </a:extLst>
-          </p:cNvPr>
-          <p:cNvSpPr>
-            <a:spLocks noGrp="1"/>
-          </p:cNvSpPr>
-          <p:nvPr>
-            <p:ph type="sldNum" sz="quarter" idx="12"/>
-          </p:nvPr>
-        </p:nvSpPr>
-        <p:spPr>
-          <a:xfrm>
-            <a:off x="10296144" y="6356350"/>
-            <a:ext cx="932688" cy="365125"/>
-          </a:xfrm>
-        </p:spPr>
-        <p:txBody>
-          <a:bodyPr vert="horz" lIns="91440" tIns="45720" rIns="91440" bIns="45720" rtlCol="0" anchor="ctr">
-            <a:normAutofit/>
-          </a:bodyPr>
-          <a:lstStyle/>
-          <a:p>
-            <a:pPr algn="l">
-              <a:spcAft>
-                <a:spcPts val="600"/>
-              </a:spcAft>
-            </a:pPr>
-            <a:fld id="{294A09A9-5501-47C1-A89A-A340965A2BE2}" type="slidenum">
-              <a:rPr lang="en-US">
-                <a:solidFill>
-                  <a:schemeClr val="tx1"/>
-                </a:solidFill>
-              </a:rPr>
-              <a:pPr algn="l">
-                <a:spcAft>
-                  <a:spcPts val="600"/>
-                </a:spcAft>
-              </a:pPr>
-              <a:t>8</a:t>
-            </a:fld>
-            <a:endParaRPr lang="en-US">
-              <a:solidFill>
-                <a:schemeClr val="tx1"/>
-              </a:solidFill>
-            </a:endParaRPr>
-          </a:p>
-        </p:txBody>
-      </p:sp>
-    </p:spTree>
-    <p:extLst>
-      <p:ext uri="{BB962C8B-B14F-4D97-AF65-F5344CB8AC3E}">
-        <p14:creationId xmlns:p14="http://schemas.microsoft.com/office/powerpoint/2010/main" val="1131219409"/>
-      </p:ext>
-    </p:extLst>
-  </p:cSld>
-  <p:clrMapOvr>
-    <a:masterClrMapping/>
-  </p:clrMapOvr>
-  <p:timing>
-    <p:tnLst>
-      <p:par>
-        <p:cTn id="1" dur="indefinite" restart="never" nodeType="tmRoot">
-          <p:childTnLst>
-            <p:seq concurrent="1" nextAc="seek">
-              <p:cTn id="2" dur="indefinite" nodeType="mainSeq">
-                <p:childTnLst>
-                  <p:par>
-                    <p:cTn id="3" fill="hold">
-                      <p:stCondLst>
-                        <p:cond delay="indefinite"/>
-                        <p:cond evt="onBegin" delay="0">
-                          <p:tn val="2"/>
-                        </p:cond>
-                      </p:stCondLst>
-                      <p:childTnLst>
-                        <p:par>
-                          <p:cTn id="4" fill="hold">
-                            <p:stCondLst>
-                              <p:cond delay="0"/>
-                            </p:stCondLst>
-                            <p:childTnLst>
-                              <p:par>
-                                <p:cTn id="5" presetID="10" presetClass="entr" presetSubtype="0" fill="hold" grpId="0" nodeType="withEffect">
-                                  <p:stCondLst>
-                                    <p:cond delay="500"/>
-                                  </p:stCondLst>
-                                  <p:iterate type="lt">
-                                    <p:tmPct val="10000"/>
+                                  <p:iterate type="wd">
+                                    <p:tmPct val="15000"/>
                                   </p:iterate>
                                   <p:childTnLst>
                                     <p:set>
@@ -11589,7 +13355,7 @@
                                     </p:set>
                                     <p:animEffect transition="in" filter="fade">
                                       <p:cBhvr>
-                                        <p:cTn id="7" dur="400"/>
+                                        <p:cTn id="7" dur="1000"/>
                                         <p:tgtEl>
                                           <p:spTgt spid="2"/>
                                         </p:tgtEl>
@@ -11645,7 +13411,13 @@
     </p:bg>
     <p:spTree>
       <p:nvGrpSpPr>
-        <p:cNvPr id="1" name=""/>
+        <p:cNvPr id="1" name="">
+          <a:extLst>
+            <a:ext uri="{FF2B5EF4-FFF2-40B4-BE49-F238E27FC236}">
+              <a16:creationId xmlns:a16="http://schemas.microsoft.com/office/drawing/2014/main" id="{74940FD1-1FFF-5D0A-13E5-5280C1E7CF8D}"/>
+            </a:ext>
+          </a:extLst>
+        </p:cNvPr>
         <p:cNvGrpSpPr/>
         <p:nvPr/>
       </p:nvGrpSpPr>
@@ -11657,12 +13429,12 @@
           <a:chExt cx="0" cy="0"/>
         </a:xfrm>
       </p:grpSpPr>
-      <p:sp useBgFill="1">
-        <p:nvSpPr>
-          <p:cNvPr id="1052" name="Rectangle 1047">
-            <a:extLst>
-              <a:ext uri="{FF2B5EF4-FFF2-40B4-BE49-F238E27FC236}">
-                <a16:creationId xmlns:a16="http://schemas.microsoft.com/office/drawing/2014/main" id="{6BC377B7-18F1-42AD-A1DD-E1D6A5B27CE9}"/>
+      <p:sp>
+        <p:nvSpPr>
+          <p:cNvPr id="10" name="Rectangle 9">
+            <a:extLst>
+              <a:ext uri="{FF2B5EF4-FFF2-40B4-BE49-F238E27FC236}">
+                <a16:creationId xmlns:a16="http://schemas.microsoft.com/office/drawing/2014/main" id="{09A1C012-8297-4361-ACE8-A2509FB18911}"/>
               </a:ext>
               <a:ext uri="{C183D7F6-B498-43B3-948B-1728B52AA6E4}">
                 <adec:decorative xmlns:adec="http://schemas.microsoft.com/office/drawing/2017/decorative" val="1"/>
@@ -11682,12 +13454,15 @@
         </p:nvSpPr>
         <p:spPr>
           <a:xfrm>
-            <a:off x="0" y="0"/>
-            <a:ext cx="12192000" cy="6858000"/>
+            <a:off x="0" y="4206240"/>
+            <a:ext cx="12192000" cy="2651760"/>
           </a:xfrm>
           <a:prstGeom prst="rect">
             <a:avLst/>
           </a:prstGeom>
+          <a:solidFill>
+            <a:schemeClr val="tx1"/>
+          </a:solidFill>
           <a:ln>
             <a:noFill/>
           </a:ln>
@@ -11717,57 +13492,135 @@
           </a:p>
         </p:txBody>
       </p:sp>
-      <p:pic>
-        <p:nvPicPr>
-          <p:cNvPr id="1026" name="Picture 2" descr="Micro Frontend; Spotify Web UI">
-            <a:extLst>
-              <a:ext uri="{FF2B5EF4-FFF2-40B4-BE49-F238E27FC236}">
-                <a16:creationId xmlns:a16="http://schemas.microsoft.com/office/drawing/2014/main" id="{51112E7E-F096-6074-954D-C58B345597CE}"/>
-              </a:ext>
-            </a:extLst>
-          </p:cNvPr>
-          <p:cNvPicPr>
-            <a:picLocks noChangeAspect="1" noChangeArrowheads="1"/>
-          </p:cNvPicPr>
-          <p:nvPr/>
-        </p:nvPicPr>
-        <p:blipFill rotWithShape="1">
-          <a:blip r:embed="rId2">
-            <a:extLst>
-              <a:ext uri="{28A0092B-C50C-407E-A947-70E740481C1C}">
-                <a14:useLocalDpi xmlns:a14="http://schemas.microsoft.com/office/drawing/2010/main" val="0"/>
-              </a:ext>
-            </a:extLst>
-          </a:blip>
-          <a:srcRect r="8444" b="-1"/>
-          <a:stretch/>
-        </p:blipFill>
-        <p:spPr bwMode="auto">
-          <a:xfrm>
-            <a:off x="1519162" y="1458685"/>
-            <a:ext cx="9153675" cy="5148943"/>
+      <p:sp useBgFill="1">
+        <p:nvSpPr>
+          <p:cNvPr id="12" name="Rectangle 11">
+            <a:extLst>
+              <a:ext uri="{FF2B5EF4-FFF2-40B4-BE49-F238E27FC236}">
+                <a16:creationId xmlns:a16="http://schemas.microsoft.com/office/drawing/2014/main" id="{4AA13AD3-0A4F-475A-BEBB-DEEFF5C096C3}"/>
+              </a:ext>
+              <a:ext uri="{C183D7F6-B498-43B3-948B-1728B52AA6E4}">
+                <adec:decorative xmlns:adec="http://schemas.microsoft.com/office/drawing/2017/decorative" val="1"/>
+              </a:ext>
+            </a:extLst>
+          </p:cNvPr>
+          <p:cNvSpPr>
+            <a:spLocks noGrp="1" noRot="1" noChangeAspect="1" noMove="1" noResize="1" noEditPoints="1" noAdjustHandles="1" noChangeArrowheads="1" noChangeShapeType="1" noTextEdit="1"/>
+          </p:cNvSpPr>
+          <p:nvPr>
+            <p:extLst>
+              <p:ext uri="{386F3935-93C4-4BCD-93E2-E3B085C9AB24}">
+                <p16:designElem xmlns:p16="http://schemas.microsoft.com/office/powerpoint/2015/main" val="1"/>
+              </p:ext>
+            </p:extLst>
+          </p:nvPr>
+        </p:nvSpPr>
+        <p:spPr>
+          <a:xfrm>
+            <a:off x="0" y="0"/>
+            <a:ext cx="12192000" cy="6858000"/>
           </a:xfrm>
           <a:prstGeom prst="rect">
             <a:avLst/>
           </a:prstGeom>
-          <a:noFill/>
-          <a:extLst>
-            <a:ext uri="{909E8E84-426E-40DD-AFC4-6F175D3DCCD1}">
-              <a14:hiddenFill xmlns:a14="http://schemas.microsoft.com/office/drawing/2010/main">
-                <a:solidFill>
-                  <a:srgbClr val="FFFFFF"/>
-                </a:solidFill>
-              </a14:hiddenFill>
-            </a:ext>
-          </a:extLst>
-        </p:spPr>
-      </p:pic>
-      <p:sp>
-        <p:nvSpPr>
-          <p:cNvPr id="8" name="Title 22">
-            <a:extLst>
-              <a:ext uri="{FF2B5EF4-FFF2-40B4-BE49-F238E27FC236}">
-                <a16:creationId xmlns:a16="http://schemas.microsoft.com/office/drawing/2014/main" id="{07F0AAEC-9371-5310-B8E0-8D793FDE0D0C}"/>
+          <a:ln>
+            <a:noFill/>
+          </a:ln>
+        </p:spPr>
+        <p:style>
+          <a:lnRef idx="2">
+            <a:schemeClr val="accent1">
+              <a:shade val="50000"/>
+            </a:schemeClr>
+          </a:lnRef>
+          <a:fillRef idx="1">
+            <a:schemeClr val="accent1"/>
+          </a:fillRef>
+          <a:effectRef idx="0">
+            <a:schemeClr val="accent1"/>
+          </a:effectRef>
+          <a:fontRef idx="minor">
+            <a:schemeClr val="lt1"/>
+          </a:fontRef>
+        </p:style>
+        <p:txBody>
+          <a:bodyPr rtlCol="0" anchor="ctr"/>
+          <a:lstStyle/>
+          <a:p>
+            <a:pPr algn="ctr"/>
+            <a:endParaRPr lang="en-US"/>
+          </a:p>
+        </p:txBody>
+      </p:sp>
+      <p:sp>
+        <p:nvSpPr>
+          <p:cNvPr id="14" name="Rectangle 13">
+            <a:extLst>
+              <a:ext uri="{FF2B5EF4-FFF2-40B4-BE49-F238E27FC236}">
+                <a16:creationId xmlns:a16="http://schemas.microsoft.com/office/drawing/2014/main" id="{205BB74C-33FB-4335-8808-49E247F7BF75}"/>
+              </a:ext>
+              <a:ext uri="{C183D7F6-B498-43B3-948B-1728B52AA6E4}">
+                <adec:decorative xmlns:adec="http://schemas.microsoft.com/office/drawing/2017/decorative" val="1"/>
+              </a:ext>
+            </a:extLst>
+          </p:cNvPr>
+          <p:cNvSpPr>
+            <a:spLocks noGrp="1" noRot="1" noChangeAspect="1" noMove="1" noResize="1" noEditPoints="1" noAdjustHandles="1" noChangeArrowheads="1" noChangeShapeType="1" noTextEdit="1"/>
+          </p:cNvSpPr>
+          <p:nvPr>
+            <p:extLst>
+              <p:ext uri="{386F3935-93C4-4BCD-93E2-E3B085C9AB24}">
+                <p16:designElem xmlns:p16="http://schemas.microsoft.com/office/powerpoint/2015/main" val="1"/>
+              </p:ext>
+            </p:extLst>
+          </p:nvPr>
+        </p:nvSpPr>
+        <p:spPr>
+          <a:xfrm>
+            <a:off x="1" y="1225106"/>
+            <a:ext cx="12192000" cy="3788958"/>
+          </a:xfrm>
+          <a:prstGeom prst="rect">
+            <a:avLst/>
+          </a:prstGeom>
+          <a:solidFill>
+            <a:schemeClr val="tx1"/>
+          </a:solidFill>
+          <a:ln>
+            <a:noFill/>
+          </a:ln>
+        </p:spPr>
+        <p:style>
+          <a:lnRef idx="2">
+            <a:schemeClr val="accent1">
+              <a:shade val="50000"/>
+            </a:schemeClr>
+          </a:lnRef>
+          <a:fillRef idx="1">
+            <a:schemeClr val="accent1"/>
+          </a:fillRef>
+          <a:effectRef idx="0">
+            <a:schemeClr val="accent1"/>
+          </a:effectRef>
+          <a:fontRef idx="minor">
+            <a:schemeClr val="lt1"/>
+          </a:fontRef>
+        </p:style>
+        <p:txBody>
+          <a:bodyPr rtlCol="0" anchor="ctr"/>
+          <a:lstStyle/>
+          <a:p>
+            <a:pPr algn="ctr"/>
+            <a:endParaRPr lang="en-US"/>
+          </a:p>
+        </p:txBody>
+      </p:sp>
+      <p:sp>
+        <p:nvSpPr>
+          <p:cNvPr id="2" name="Titel 1">
+            <a:extLst>
+              <a:ext uri="{FF2B5EF4-FFF2-40B4-BE49-F238E27FC236}">
+                <a16:creationId xmlns:a16="http://schemas.microsoft.com/office/drawing/2014/main" id="{8D5C85C6-C99F-5FFC-3A6A-BC37712EBABB}"/>
               </a:ext>
             </a:extLst>
           </p:cNvPr>
@@ -11780,8 +13633,197 @@
         </p:nvSpPr>
         <p:spPr>
           <a:xfrm>
-            <a:off x="0" y="0"/>
-            <a:ext cx="12192000" cy="1458685"/>
+            <a:off x="960120" y="1841412"/>
+            <a:ext cx="10268712" cy="2688020"/>
+          </a:xfrm>
+        </p:spPr>
+        <p:txBody>
+          <a:bodyPr vert="horz" lIns="91440" tIns="45720" rIns="91440" bIns="45720" rtlCol="0" anchor="ctr">
+            <a:noAutofit/>
+          </a:bodyPr>
+          <a:lstStyle/>
+          <a:p>
+            <a:r>
+              <a:rPr lang="en-US" sz="2800" dirty="0" err="1"/>
+              <a:t>Waarom</a:t>
+            </a:r>
+            <a:r>
+              <a:rPr lang="en-US" sz="2800" dirty="0"/>
+              <a:t> </a:t>
+            </a:r>
+            <a:r>
+              <a:rPr lang="en-US" sz="2800" dirty="0" err="1"/>
+              <a:t>niet</a:t>
+            </a:r>
+            <a:r>
+              <a:rPr lang="en-US" sz="2800" dirty="0"/>
+              <a:t>?</a:t>
+            </a:r>
+            <a:br>
+              <a:rPr lang="en-US" sz="1400" dirty="0"/>
+            </a:br>
+            <a:br>
+              <a:rPr lang="en-US" sz="1400" dirty="0"/>
+            </a:br>
+            <a:br>
+              <a:rPr lang="en-US" sz="1400" dirty="0"/>
+            </a:br>
+            <a:r>
+              <a:rPr lang="nl-NL" sz="1400" b="1" cap="none" dirty="0">
+                <a:latin typeface="Arial" panose="020B0604020202020204" pitchFamily="34" charset="0"/>
+                <a:cs typeface="Arial" panose="020B0604020202020204" pitchFamily="34" charset="0"/>
+              </a:rPr>
+              <a:t>Complexiteit</a:t>
+            </a:r>
+            <a:r>
+              <a:rPr lang="nl-NL" sz="1400" cap="none" dirty="0">
+                <a:latin typeface="Arial" panose="020B0604020202020204" pitchFamily="34" charset="0"/>
+                <a:cs typeface="Arial" panose="020B0604020202020204" pitchFamily="34" charset="0"/>
+              </a:rPr>
+              <a:t>: het beheren van meerdere front-end modules kan complex zijn, wat extra overhead met zich meebrengt bij ontwikkeling, testen en implementatie.</a:t>
+            </a:r>
+            <a:br>
+              <a:rPr lang="nl-NL" sz="1400" cap="none" dirty="0">
+                <a:latin typeface="Arial" panose="020B0604020202020204" pitchFamily="34" charset="0"/>
+                <a:cs typeface="Arial" panose="020B0604020202020204" pitchFamily="34" charset="0"/>
+              </a:rPr>
+            </a:br>
+            <a:br>
+              <a:rPr lang="nl-NL" sz="1400" cap="none" dirty="0">
+                <a:latin typeface="Arial" panose="020B0604020202020204" pitchFamily="34" charset="0"/>
+                <a:cs typeface="Arial" panose="020B0604020202020204" pitchFamily="34" charset="0"/>
+              </a:rPr>
+            </a:br>
+            <a:r>
+              <a:rPr lang="nl-NL" sz="1400" b="1" cap="none" dirty="0">
+                <a:latin typeface="Arial" panose="020B0604020202020204" pitchFamily="34" charset="0"/>
+                <a:cs typeface="Arial" panose="020B0604020202020204" pitchFamily="34" charset="0"/>
+              </a:rPr>
+              <a:t>Communicatie-overhead</a:t>
+            </a:r>
+            <a:r>
+              <a:rPr lang="nl-NL" sz="1400" cap="none" dirty="0">
+                <a:latin typeface="Arial" panose="020B0604020202020204" pitchFamily="34" charset="0"/>
+                <a:cs typeface="Arial" panose="020B0604020202020204" pitchFamily="34" charset="0"/>
+              </a:rPr>
+              <a:t>: coördinatie tussen </a:t>
+            </a:r>
+            <a:r>
+              <a:rPr lang="nl-NL" sz="1400" cap="none" dirty="0" err="1">
+                <a:latin typeface="Arial" panose="020B0604020202020204" pitchFamily="34" charset="0"/>
+                <a:cs typeface="Arial" panose="020B0604020202020204" pitchFamily="34" charset="0"/>
+              </a:rPr>
+              <a:t>microfrontends</a:t>
+            </a:r>
+            <a:r>
+              <a:rPr lang="nl-NL" sz="1400" cap="none" dirty="0">
+                <a:latin typeface="Arial" panose="020B0604020202020204" pitchFamily="34" charset="0"/>
+                <a:cs typeface="Arial" panose="020B0604020202020204" pitchFamily="34" charset="0"/>
+              </a:rPr>
+              <a:t> vereist meer inspanning, wat kan leiden tot problemen bij het synchroniseren van state en gegevensuitwisseling.</a:t>
+            </a:r>
+            <a:br>
+              <a:rPr lang="nl-NL" sz="1400" cap="none" dirty="0">
+                <a:latin typeface="Arial" panose="020B0604020202020204" pitchFamily="34" charset="0"/>
+                <a:cs typeface="Arial" panose="020B0604020202020204" pitchFamily="34" charset="0"/>
+              </a:rPr>
+            </a:br>
+            <a:br>
+              <a:rPr lang="nl-NL" sz="1400" cap="none" dirty="0">
+                <a:latin typeface="Arial" panose="020B0604020202020204" pitchFamily="34" charset="0"/>
+                <a:cs typeface="Arial" panose="020B0604020202020204" pitchFamily="34" charset="0"/>
+              </a:rPr>
+            </a:br>
+            <a:r>
+              <a:rPr lang="nl-NL" sz="1400" b="1" cap="none" dirty="0">
+                <a:latin typeface="Arial" panose="020B0604020202020204" pitchFamily="34" charset="0"/>
+                <a:cs typeface="Arial" panose="020B0604020202020204" pitchFamily="34" charset="0"/>
+              </a:rPr>
+              <a:t>Prestatie-impact</a:t>
+            </a:r>
+            <a:r>
+              <a:rPr lang="nl-NL" sz="1400" cap="none" dirty="0">
+                <a:latin typeface="Arial" panose="020B0604020202020204" pitchFamily="34" charset="0"/>
+                <a:cs typeface="Arial" panose="020B0604020202020204" pitchFamily="34" charset="0"/>
+              </a:rPr>
+              <a:t>: de architectuur kan leiden tot vertragingen in laadtijden en responsiviteit, vooral bij veel kleine modules met afhankelijkheden van netwerkverzoeken.</a:t>
+            </a:r>
+            <a:br>
+              <a:rPr lang="nl-NL" sz="1400" cap="none" dirty="0">
+                <a:latin typeface="Arial" panose="020B0604020202020204" pitchFamily="34" charset="0"/>
+                <a:cs typeface="Arial" panose="020B0604020202020204" pitchFamily="34" charset="0"/>
+              </a:rPr>
+            </a:br>
+            <a:br>
+              <a:rPr lang="nl-NL" sz="1400" cap="none" dirty="0">
+                <a:latin typeface="Arial" panose="020B0604020202020204" pitchFamily="34" charset="0"/>
+                <a:cs typeface="Arial" panose="020B0604020202020204" pitchFamily="34" charset="0"/>
+              </a:rPr>
+            </a:br>
+            <a:r>
+              <a:rPr lang="nl-NL" sz="1400" b="1" cap="none" dirty="0">
+                <a:latin typeface="Arial" panose="020B0604020202020204" pitchFamily="34" charset="0"/>
+                <a:cs typeface="Arial" panose="020B0604020202020204" pitchFamily="34" charset="0"/>
+              </a:rPr>
+              <a:t>Consistente gebruikerservaring</a:t>
+            </a:r>
+            <a:r>
+              <a:rPr lang="nl-NL" sz="1400" cap="none" dirty="0">
+                <a:latin typeface="Arial" panose="020B0604020202020204" pitchFamily="34" charset="0"/>
+                <a:cs typeface="Arial" panose="020B0604020202020204" pitchFamily="34" charset="0"/>
+              </a:rPr>
+              <a:t>: het kan uitdagend zijn om consistentie in design en gebruikerservaring te handhaven over verschillende </a:t>
+            </a:r>
+            <a:r>
+              <a:rPr lang="nl-NL" sz="1400" cap="none" dirty="0" err="1">
+                <a:latin typeface="Arial" panose="020B0604020202020204" pitchFamily="34" charset="0"/>
+                <a:cs typeface="Arial" panose="020B0604020202020204" pitchFamily="34" charset="0"/>
+              </a:rPr>
+              <a:t>microfrontends</a:t>
+            </a:r>
+            <a:r>
+              <a:rPr lang="nl-NL" sz="1400" cap="none" dirty="0">
+                <a:latin typeface="Arial" panose="020B0604020202020204" pitchFamily="34" charset="0"/>
+                <a:cs typeface="Arial" panose="020B0604020202020204" pitchFamily="34" charset="0"/>
+              </a:rPr>
+              <a:t>, vooral als verschillende teams eraan werken.</a:t>
+            </a:r>
+            <a:br>
+              <a:rPr lang="nl-NL" sz="1400" cap="none" dirty="0">
+                <a:latin typeface="Arial" panose="020B0604020202020204" pitchFamily="34" charset="0"/>
+                <a:cs typeface="Arial" panose="020B0604020202020204" pitchFamily="34" charset="0"/>
+              </a:rPr>
+            </a:br>
+            <a:br>
+              <a:rPr lang="nl-NL" sz="1400" cap="none" dirty="0">
+                <a:latin typeface="Arial" panose="020B0604020202020204" pitchFamily="34" charset="0"/>
+                <a:cs typeface="Arial" panose="020B0604020202020204" pitchFamily="34" charset="0"/>
+              </a:rPr>
+            </a:br>
+            <a:endParaRPr lang="en-US" sz="1400" dirty="0"/>
+          </a:p>
+        </p:txBody>
+      </p:sp>
+      <p:sp>
+        <p:nvSpPr>
+          <p:cNvPr id="5" name="Tijdelijke aanduiding voor dianummer 4">
+            <a:extLst>
+              <a:ext uri="{FF2B5EF4-FFF2-40B4-BE49-F238E27FC236}">
+                <a16:creationId xmlns:a16="http://schemas.microsoft.com/office/drawing/2014/main" id="{CD39B5C8-6779-A82E-C3C8-999D9BBB5B1F}"/>
+              </a:ext>
+            </a:extLst>
+          </p:cNvPr>
+          <p:cNvSpPr>
+            <a:spLocks noGrp="1"/>
+          </p:cNvSpPr>
+          <p:nvPr>
+            <p:ph type="sldNum" sz="quarter" idx="12"/>
+          </p:nvPr>
+        </p:nvSpPr>
+        <p:spPr>
+          <a:xfrm>
+            <a:off x="10296144" y="6356350"/>
+            <a:ext cx="932688" cy="365125"/>
           </a:xfrm>
         </p:spPr>
         <p:txBody>
@@ -11790,32 +13832,25 @@
           </a:bodyPr>
           <a:lstStyle/>
           <a:p>
-            <a:pPr algn="ctr"/>
-            <a:r>
-              <a:rPr lang="en-US" sz="5400" dirty="0" err="1">
+            <a:pPr algn="l">
+              <a:spcAft>
+                <a:spcPts val="600"/>
+              </a:spcAft>
+            </a:pPr>
+            <a:fld id="{294A09A9-5501-47C1-A89A-A340965A2BE2}" type="slidenum">
+              <a:rPr lang="en-US">
                 <a:solidFill>
                   <a:schemeClr val="tx1"/>
                 </a:solidFill>
               </a:rPr>
-              <a:t>iframe</a:t>
-            </a:r>
-            <a:r>
-              <a:rPr lang="en-US" sz="5400" dirty="0">
-                <a:solidFill>
-                  <a:schemeClr val="tx1"/>
-                </a:solidFill>
-              </a:rPr>
-              <a:t> </a:t>
-            </a:r>
-            <a:r>
-              <a:rPr lang="en-US" sz="5400" dirty="0" err="1">
-                <a:solidFill>
-                  <a:schemeClr val="tx1"/>
-                </a:solidFill>
-              </a:rPr>
-              <a:t>integratie</a:t>
-            </a:r>
-            <a:endParaRPr lang="en-US" sz="5400" dirty="0">
+              <a:pPr algn="l">
+                <a:spcAft>
+                  <a:spcPts val="600"/>
+                </a:spcAft>
+              </a:pPr>
+              <a:t>9</a:t>
+            </a:fld>
+            <a:endParaRPr lang="en-US">
               <a:solidFill>
                 <a:schemeClr val="tx1"/>
               </a:solidFill>
@@ -11826,13 +13861,21 @@
     </p:spTree>
     <p:extLst>
       <p:ext uri="{BB962C8B-B14F-4D97-AF65-F5344CB8AC3E}">
-        <p14:creationId xmlns:p14="http://schemas.microsoft.com/office/powerpoint/2010/main" val="999340151"/>
+        <p14:creationId xmlns:p14="http://schemas.microsoft.com/office/powerpoint/2010/main" val="2544674863"/>
       </p:ext>
     </p:extLst>
   </p:cSld>
   <p:clrMapOvr>
-    <a:masterClrMapping/>
+    <a:overrideClrMapping bg1="dk1" tx1="lt1" bg2="dk2" tx2="lt2" accent1="accent1" accent2="accent2" accent3="accent3" accent4="accent4" accent5="accent5" accent6="accent6" hlink="hlink" folHlink="folHlink"/>
   </p:clrMapOvr>
+  <mc:AlternateContent xmlns:mc="http://schemas.openxmlformats.org/markup-compatibility/2006">
+    <mc:Choice xmlns:p14="http://schemas.microsoft.com/office/powerpoint/2010/main" Requires="p14">
+      <p:transition p14:dur="10"/>
+    </mc:Choice>
+    <mc:Fallback>
+      <p:transition/>
+    </mc:Fallback>
+  </mc:AlternateContent>
   <p:timing>
     <p:tnLst>
       <p:par>
@@ -11861,9 +13904,6 @@
                                   <p:stCondLst>
                                     <p:cond delay="500"/>
                                   </p:stCondLst>
-                                  <p:iterate>
-                                    <p:tmPct val="10000"/>
-                                  </p:iterate>
                                   <p:childTnLst>
                                     <p:set>
                                       <p:cBhvr>
@@ -11873,7 +13913,7 @@
                                           </p:stCondLst>
                                         </p:cTn>
                                         <p:tgtEl>
-                                          <p:spTgt spid="8"/>
+                                          <p:spTgt spid="2"/>
                                         </p:tgtEl>
                                         <p:attrNameLst>
                                           <p:attrName>style.visibility</p:attrName>
@@ -11885,9 +13925,9 @@
                                     </p:set>
                                     <p:animEffect transition="in" filter="fade">
                                       <p:cBhvr>
-                                        <p:cTn id="7" dur="700"/>
+                                        <p:cTn id="7" dur="1000"/>
                                         <p:tgtEl>
-                                          <p:spTgt spid="8"/>
+                                          <p:spTgt spid="2"/>
                                         </p:tgtEl>
                                       </p:cBhvr>
                                     </p:animEffect>
@@ -11922,7 +13962,7 @@
       </p:par>
     </p:tnLst>
     <p:bldLst>
-      <p:bldP spid="8" grpId="0"/>
+      <p:bldP spid="2" grpId="0"/>
     </p:bldLst>
   </p:timing>
 </p:sld>

</xml_diff>